<commit_message>
add library to setup for goepands
</commit_message>
<xml_diff>
--- a/eureca_building/example_scripts/UML Diagram.pptx
+++ b/eureca_building/example_scripts/UML Diagram.pptx
@@ -6,6 +6,7 @@
   </p:sldMasterIdLst>
   <p:sldIdLst>
     <p:sldId id="256" r:id="rId2"/>
+    <p:sldId id="257" r:id="rId3"/>
   </p:sldIdLst>
   <p:sldSz cx="21599525" cy="14400213"/>
   <p:notesSz cx="6858000" cy="9144000"/>
@@ -243,7 +244,7 @@
           <a:p>
             <a:fld id="{86C27474-989E-4D95-9339-934E63F1ADDB}" type="datetimeFigureOut">
               <a:rPr lang="it-IT" smtClean="0"/>
-              <a:t>06/03/2023</a:t>
+              <a:t>30/10/2023</a:t>
             </a:fld>
             <a:endParaRPr lang="it-IT"/>
           </a:p>
@@ -413,7 +414,7 @@
           <a:p>
             <a:fld id="{86C27474-989E-4D95-9339-934E63F1ADDB}" type="datetimeFigureOut">
               <a:rPr lang="it-IT" smtClean="0"/>
-              <a:t>06/03/2023</a:t>
+              <a:t>30/10/2023</a:t>
             </a:fld>
             <a:endParaRPr lang="it-IT"/>
           </a:p>
@@ -593,7 +594,7 @@
           <a:p>
             <a:fld id="{86C27474-989E-4D95-9339-934E63F1ADDB}" type="datetimeFigureOut">
               <a:rPr lang="it-IT" smtClean="0"/>
-              <a:t>06/03/2023</a:t>
+              <a:t>30/10/2023</a:t>
             </a:fld>
             <a:endParaRPr lang="it-IT"/>
           </a:p>
@@ -763,7 +764,7 @@
           <a:p>
             <a:fld id="{86C27474-989E-4D95-9339-934E63F1ADDB}" type="datetimeFigureOut">
               <a:rPr lang="it-IT" smtClean="0"/>
-              <a:t>06/03/2023</a:t>
+              <a:t>30/10/2023</a:t>
             </a:fld>
             <a:endParaRPr lang="it-IT"/>
           </a:p>
@@ -1007,7 +1008,7 @@
           <a:p>
             <a:fld id="{86C27474-989E-4D95-9339-934E63F1ADDB}" type="datetimeFigureOut">
               <a:rPr lang="it-IT" smtClean="0"/>
-              <a:t>06/03/2023</a:t>
+              <a:t>30/10/2023</a:t>
             </a:fld>
             <a:endParaRPr lang="it-IT"/>
           </a:p>
@@ -1239,7 +1240,7 @@
           <a:p>
             <a:fld id="{86C27474-989E-4D95-9339-934E63F1ADDB}" type="datetimeFigureOut">
               <a:rPr lang="it-IT" smtClean="0"/>
-              <a:t>06/03/2023</a:t>
+              <a:t>30/10/2023</a:t>
             </a:fld>
             <a:endParaRPr lang="it-IT"/>
           </a:p>
@@ -1606,7 +1607,7 @@
           <a:p>
             <a:fld id="{86C27474-989E-4D95-9339-934E63F1ADDB}" type="datetimeFigureOut">
               <a:rPr lang="it-IT" smtClean="0"/>
-              <a:t>06/03/2023</a:t>
+              <a:t>30/10/2023</a:t>
             </a:fld>
             <a:endParaRPr lang="it-IT"/>
           </a:p>
@@ -1724,7 +1725,7 @@
           <a:p>
             <a:fld id="{86C27474-989E-4D95-9339-934E63F1ADDB}" type="datetimeFigureOut">
               <a:rPr lang="it-IT" smtClean="0"/>
-              <a:t>06/03/2023</a:t>
+              <a:t>30/10/2023</a:t>
             </a:fld>
             <a:endParaRPr lang="it-IT"/>
           </a:p>
@@ -1819,7 +1820,7 @@
           <a:p>
             <a:fld id="{86C27474-989E-4D95-9339-934E63F1ADDB}" type="datetimeFigureOut">
               <a:rPr lang="it-IT" smtClean="0"/>
-              <a:t>06/03/2023</a:t>
+              <a:t>30/10/2023</a:t>
             </a:fld>
             <a:endParaRPr lang="it-IT"/>
           </a:p>
@@ -2096,7 +2097,7 @@
           <a:p>
             <a:fld id="{86C27474-989E-4D95-9339-934E63F1ADDB}" type="datetimeFigureOut">
               <a:rPr lang="it-IT" smtClean="0"/>
-              <a:t>06/03/2023</a:t>
+              <a:t>30/10/2023</a:t>
             </a:fld>
             <a:endParaRPr lang="it-IT"/>
           </a:p>
@@ -2353,7 +2354,7 @@
           <a:p>
             <a:fld id="{86C27474-989E-4D95-9339-934E63F1ADDB}" type="datetimeFigureOut">
               <a:rPr lang="it-IT" smtClean="0"/>
-              <a:t>06/03/2023</a:t>
+              <a:t>30/10/2023</a:t>
             </a:fld>
             <a:endParaRPr lang="it-IT"/>
           </a:p>
@@ -2566,7 +2567,7 @@
           <a:p>
             <a:fld id="{86C27474-989E-4D95-9339-934E63F1ADDB}" type="datetimeFigureOut">
               <a:rPr lang="it-IT" smtClean="0"/>
-              <a:t>06/03/2023</a:t>
+              <a:t>30/10/2023</a:t>
             </a:fld>
             <a:endParaRPr lang="it-IT"/>
           </a:p>
@@ -2989,6 +2990,3533 @@
         </p:nvCxnSpPr>
         <p:spPr>
           <a:xfrm rot="5400000" flipH="1" flipV="1">
+            <a:off x="12333460" y="1654618"/>
+            <a:ext cx="3462920" cy="2705671"/>
+          </a:xfrm>
+          <a:prstGeom prst="bentConnector3">
+            <a:avLst>
+              <a:gd name="adj1" fmla="val 50000"/>
+            </a:avLst>
+          </a:prstGeom>
+          <a:ln>
+            <a:solidFill>
+              <a:schemeClr val="tx1"/>
+            </a:solidFill>
+            <a:tailEnd type="triangle"/>
+          </a:ln>
+        </p:spPr>
+        <p:style>
+          <a:lnRef idx="1">
+            <a:schemeClr val="accent1"/>
+          </a:lnRef>
+          <a:fillRef idx="0">
+            <a:schemeClr val="accent1"/>
+          </a:fillRef>
+          <a:effectRef idx="0">
+            <a:schemeClr val="accent1"/>
+          </a:effectRef>
+          <a:fontRef idx="minor">
+            <a:schemeClr val="tx1"/>
+          </a:fontRef>
+        </p:style>
+      </p:cxnSp>
+      <p:cxnSp>
+        <p:nvCxnSpPr>
+          <p:cNvPr id="19" name="Connector: Elbow 18">
+            <a:extLst>
+              <a:ext uri="{FF2B5EF4-FFF2-40B4-BE49-F238E27FC236}">
+                <a16:creationId xmlns:a16="http://schemas.microsoft.com/office/drawing/2014/main" id="{B1A427EB-355E-4A97-9AEB-C79DA0D60BEB}"/>
+              </a:ext>
+            </a:extLst>
+          </p:cNvPr>
+          <p:cNvCxnSpPr>
+            <a:cxnSpLocks/>
+            <a:stCxn id="5" idx="0"/>
+            <a:endCxn id="8" idx="2"/>
+          </p:cNvCxnSpPr>
+          <p:nvPr/>
+        </p:nvCxnSpPr>
+        <p:spPr>
+          <a:xfrm rot="5400000" flipH="1" flipV="1">
+            <a:off x="4992055" y="-50630"/>
+            <a:ext cx="1359156" cy="4138754"/>
+          </a:xfrm>
+          <a:prstGeom prst="bentConnector3">
+            <a:avLst>
+              <a:gd name="adj1" fmla="val 50000"/>
+            </a:avLst>
+          </a:prstGeom>
+          <a:ln>
+            <a:solidFill>
+              <a:schemeClr val="tx1"/>
+            </a:solidFill>
+            <a:tailEnd type="triangle"/>
+          </a:ln>
+        </p:spPr>
+        <p:style>
+          <a:lnRef idx="1">
+            <a:schemeClr val="accent1"/>
+          </a:lnRef>
+          <a:fillRef idx="0">
+            <a:schemeClr val="accent1"/>
+          </a:fillRef>
+          <a:effectRef idx="0">
+            <a:schemeClr val="accent1"/>
+          </a:effectRef>
+          <a:fontRef idx="minor">
+            <a:schemeClr val="tx1"/>
+          </a:fontRef>
+        </p:style>
+      </p:cxnSp>
+      <p:graphicFrame>
+        <p:nvGraphicFramePr>
+          <p:cNvPr id="4" name="Table 3">
+            <a:extLst>
+              <a:ext uri="{FF2B5EF4-FFF2-40B4-BE49-F238E27FC236}">
+                <a16:creationId xmlns:a16="http://schemas.microsoft.com/office/drawing/2014/main" id="{981A1266-A4F0-4C10-B51F-2B575EFC2944}"/>
+              </a:ext>
+            </a:extLst>
+          </p:cNvPr>
+          <p:cNvGraphicFramePr>
+            <a:graphicFrameLocks noGrp="1"/>
+          </p:cNvGraphicFramePr>
+          <p:nvPr>
+            <p:extLst>
+              <p:ext uri="{D42A27DB-BD31-4B8C-83A1-F6EECF244321}">
+                <p14:modId xmlns:p14="http://schemas.microsoft.com/office/powerpoint/2010/main" val="2628997934"/>
+              </p:ext>
+            </p:extLst>
+          </p:nvPr>
+        </p:nvGraphicFramePr>
+        <p:xfrm>
+          <a:off x="373380" y="866732"/>
+          <a:ext cx="1801014" cy="501881"/>
+        </p:xfrm>
+        <a:graphic>
+          <a:graphicData uri="http://schemas.openxmlformats.org/drawingml/2006/table">
+            <a:tbl>
+              <a:tblPr firstRow="1" bandRow="1">
+                <a:tableStyleId>{21E4AEA4-8DFA-4A89-87EB-49C32662AFE0}</a:tableStyleId>
+              </a:tblPr>
+              <a:tblGrid>
+                <a:gridCol w="1801014">
+                  <a:extLst>
+                    <a:ext uri="{9D8B030D-6E8A-4147-A177-3AD203B41FA5}">
+                      <a16:colId xmlns:a16="http://schemas.microsoft.com/office/drawing/2014/main" val="1895854942"/>
+                    </a:ext>
+                  </a:extLst>
+                </a:gridCol>
+              </a:tblGrid>
+              <a:tr h="501881">
+                <a:tc>
+                  <a:txBody>
+                    <a:bodyPr/>
+                    <a:lstStyle/>
+                    <a:p>
+                      <a:pPr algn="ctr"/>
+                      <a:r>
+                        <a:rPr lang="it-IT" sz="2500" dirty="0"/>
+                        <a:t>WeatherFile</a:t>
+                      </a:r>
+                      <a:endParaRPr lang="it-IT" sz="2500" dirty="0">
+                        <a:solidFill>
+                          <a:schemeClr val="tx1"/>
+                        </a:solidFill>
+                      </a:endParaRPr>
+                    </a:p>
+                  </a:txBody>
+                  <a:tcPr>
+                    <a:lnL w="12700" cap="flat" cmpd="sng" algn="ctr">
+                      <a:solidFill>
+                        <a:schemeClr val="tx1"/>
+                      </a:solidFill>
+                      <a:prstDash val="solid"/>
+                      <a:round/>
+                      <a:headEnd type="none" w="med" len="med"/>
+                      <a:tailEnd type="none" w="med" len="med"/>
+                    </a:lnL>
+                    <a:lnR w="12700" cap="flat" cmpd="sng" algn="ctr">
+                      <a:solidFill>
+                        <a:schemeClr val="tx1"/>
+                      </a:solidFill>
+                      <a:prstDash val="solid"/>
+                      <a:round/>
+                      <a:headEnd type="none" w="med" len="med"/>
+                      <a:tailEnd type="none" w="med" len="med"/>
+                    </a:lnR>
+                    <a:lnT w="12700" cap="flat" cmpd="sng" algn="ctr">
+                      <a:solidFill>
+                        <a:schemeClr val="tx1"/>
+                      </a:solidFill>
+                      <a:prstDash val="solid"/>
+                      <a:round/>
+                      <a:headEnd type="none" w="med" len="med"/>
+                      <a:tailEnd type="none" w="med" len="med"/>
+                    </a:lnT>
+                    <a:lnB w="12700" cap="flat" cmpd="sng" algn="ctr">
+                      <a:solidFill>
+                        <a:schemeClr val="tx1"/>
+                      </a:solidFill>
+                      <a:prstDash val="solid"/>
+                      <a:round/>
+                      <a:headEnd type="none" w="med" len="med"/>
+                      <a:tailEnd type="none" w="med" len="med"/>
+                    </a:lnB>
+                  </a:tcPr>
+                </a:tc>
+                <a:extLst>
+                  <a:ext uri="{0D108BD9-81ED-4DB2-BD59-A6C34878D82A}">
+                    <a16:rowId xmlns:a16="http://schemas.microsoft.com/office/drawing/2014/main" val="3647233555"/>
+                  </a:ext>
+                </a:extLst>
+              </a:tr>
+            </a:tbl>
+          </a:graphicData>
+        </a:graphic>
+      </p:graphicFrame>
+      <p:graphicFrame>
+        <p:nvGraphicFramePr>
+          <p:cNvPr id="5" name="Table 4">
+            <a:extLst>
+              <a:ext uri="{FF2B5EF4-FFF2-40B4-BE49-F238E27FC236}">
+                <a16:creationId xmlns:a16="http://schemas.microsoft.com/office/drawing/2014/main" id="{97460E20-F91C-4A67-8B03-A5B0DADB7C84}"/>
+              </a:ext>
+            </a:extLst>
+          </p:cNvPr>
+          <p:cNvGraphicFramePr>
+            <a:graphicFrameLocks noGrp="1"/>
+          </p:cNvGraphicFramePr>
+          <p:nvPr>
+            <p:extLst>
+              <p:ext uri="{D42A27DB-BD31-4B8C-83A1-F6EECF244321}">
+                <p14:modId xmlns:p14="http://schemas.microsoft.com/office/powerpoint/2010/main" val="3652097619"/>
+              </p:ext>
+            </p:extLst>
+          </p:nvPr>
+        </p:nvGraphicFramePr>
+        <p:xfrm>
+          <a:off x="2654841" y="2698325"/>
+          <a:ext cx="1894831" cy="853440"/>
+        </p:xfrm>
+        <a:graphic>
+          <a:graphicData uri="http://schemas.openxmlformats.org/drawingml/2006/table">
+            <a:tbl>
+              <a:tblPr firstRow="1" bandRow="1">
+                <a:tableStyleId>{00A15C55-8517-42AA-B614-E9B94910E393}</a:tableStyleId>
+              </a:tblPr>
+              <a:tblGrid>
+                <a:gridCol w="1894831">
+                  <a:extLst>
+                    <a:ext uri="{9D8B030D-6E8A-4147-A177-3AD203B41FA5}">
+                      <a16:colId xmlns:a16="http://schemas.microsoft.com/office/drawing/2014/main" val="1895854942"/>
+                    </a:ext>
+                  </a:extLst>
+                </a:gridCol>
+              </a:tblGrid>
+              <a:tr h="389355">
+                <a:tc>
+                  <a:txBody>
+                    <a:bodyPr/>
+                    <a:lstStyle/>
+                    <a:p>
+                      <a:pPr algn="ctr"/>
+                      <a:r>
+                        <a:rPr lang="it-IT" sz="2500" dirty="0">
+                          <a:solidFill>
+                            <a:schemeClr val="tx1"/>
+                          </a:solidFill>
+                        </a:rPr>
+                        <a:t>ConstructionDataset</a:t>
+                      </a:r>
+                    </a:p>
+                  </a:txBody>
+                  <a:tcPr>
+                    <a:lnL w="12700" cap="flat" cmpd="sng" algn="ctr">
+                      <a:solidFill>
+                        <a:schemeClr val="tx1"/>
+                      </a:solidFill>
+                      <a:prstDash val="solid"/>
+                      <a:round/>
+                      <a:headEnd type="none" w="med" len="med"/>
+                      <a:tailEnd type="none" w="med" len="med"/>
+                    </a:lnL>
+                    <a:lnR w="12700" cap="flat" cmpd="sng" algn="ctr">
+                      <a:solidFill>
+                        <a:schemeClr val="tx1"/>
+                      </a:solidFill>
+                      <a:prstDash val="solid"/>
+                      <a:round/>
+                      <a:headEnd type="none" w="med" len="med"/>
+                      <a:tailEnd type="none" w="med" len="med"/>
+                    </a:lnR>
+                    <a:lnT w="12700" cap="flat" cmpd="sng" algn="ctr">
+                      <a:solidFill>
+                        <a:schemeClr val="tx1"/>
+                      </a:solidFill>
+                      <a:prstDash val="solid"/>
+                      <a:round/>
+                      <a:headEnd type="none" w="med" len="med"/>
+                      <a:tailEnd type="none" w="med" len="med"/>
+                    </a:lnT>
+                    <a:lnB w="12700" cap="flat" cmpd="sng" algn="ctr">
+                      <a:solidFill>
+                        <a:schemeClr val="tx1"/>
+                      </a:solidFill>
+                      <a:prstDash val="solid"/>
+                      <a:round/>
+                      <a:headEnd type="none" w="med" len="med"/>
+                      <a:tailEnd type="none" w="med" len="med"/>
+                    </a:lnB>
+                  </a:tcPr>
+                </a:tc>
+                <a:extLst>
+                  <a:ext uri="{0D108BD9-81ED-4DB2-BD59-A6C34878D82A}">
+                    <a16:rowId xmlns:a16="http://schemas.microsoft.com/office/drawing/2014/main" val="3647233555"/>
+                  </a:ext>
+                </a:extLst>
+              </a:tr>
+            </a:tbl>
+          </a:graphicData>
+        </a:graphic>
+      </p:graphicFrame>
+      <p:graphicFrame>
+        <p:nvGraphicFramePr>
+          <p:cNvPr id="6" name="Table 5">
+            <a:extLst>
+              <a:ext uri="{FF2B5EF4-FFF2-40B4-BE49-F238E27FC236}">
+                <a16:creationId xmlns:a16="http://schemas.microsoft.com/office/drawing/2014/main" id="{1F24C387-6449-4BF8-B454-DCD5EBAA7883}"/>
+              </a:ext>
+            </a:extLst>
+          </p:cNvPr>
+          <p:cNvGraphicFramePr>
+            <a:graphicFrameLocks noGrp="1"/>
+          </p:cNvGraphicFramePr>
+          <p:nvPr>
+            <p:extLst>
+              <p:ext uri="{D42A27DB-BD31-4B8C-83A1-F6EECF244321}">
+                <p14:modId xmlns:p14="http://schemas.microsoft.com/office/powerpoint/2010/main" val="2415767420"/>
+              </p:ext>
+            </p:extLst>
+          </p:nvPr>
+        </p:nvGraphicFramePr>
+        <p:xfrm>
+          <a:off x="2465724" y="866730"/>
+          <a:ext cx="2258871" cy="472440"/>
+        </p:xfrm>
+        <a:graphic>
+          <a:graphicData uri="http://schemas.openxmlformats.org/drawingml/2006/table">
+            <a:tbl>
+              <a:tblPr firstRow="1" bandRow="1">
+                <a:tableStyleId>{00A15C55-8517-42AA-B614-E9B94910E393}</a:tableStyleId>
+              </a:tblPr>
+              <a:tblGrid>
+                <a:gridCol w="2258871">
+                  <a:extLst>
+                    <a:ext uri="{9D8B030D-6E8A-4147-A177-3AD203B41FA5}">
+                      <a16:colId xmlns:a16="http://schemas.microsoft.com/office/drawing/2014/main" val="1895854942"/>
+                    </a:ext>
+                  </a:extLst>
+                </a:gridCol>
+              </a:tblGrid>
+              <a:tr h="389355">
+                <a:tc>
+                  <a:txBody>
+                    <a:bodyPr/>
+                    <a:lstStyle/>
+                    <a:p>
+                      <a:pPr algn="ctr"/>
+                      <a:r>
+                        <a:rPr lang="it-IT" sz="2500" dirty="0">
+                          <a:solidFill>
+                            <a:schemeClr val="tx1"/>
+                          </a:solidFill>
+                        </a:rPr>
+                        <a:t>SimpleWindow</a:t>
+                      </a:r>
+                    </a:p>
+                  </a:txBody>
+                  <a:tcPr>
+                    <a:lnL w="12700" cap="flat" cmpd="sng" algn="ctr">
+                      <a:solidFill>
+                        <a:schemeClr val="tx1"/>
+                      </a:solidFill>
+                      <a:prstDash val="solid"/>
+                      <a:round/>
+                      <a:headEnd type="none" w="med" len="med"/>
+                      <a:tailEnd type="none" w="med" len="med"/>
+                    </a:lnL>
+                    <a:lnR w="12700" cap="flat" cmpd="sng" algn="ctr">
+                      <a:solidFill>
+                        <a:schemeClr val="tx1"/>
+                      </a:solidFill>
+                      <a:prstDash val="solid"/>
+                      <a:round/>
+                      <a:headEnd type="none" w="med" len="med"/>
+                      <a:tailEnd type="none" w="med" len="med"/>
+                    </a:lnR>
+                    <a:lnT w="12700" cap="flat" cmpd="sng" algn="ctr">
+                      <a:solidFill>
+                        <a:schemeClr val="tx1"/>
+                      </a:solidFill>
+                      <a:prstDash val="solid"/>
+                      <a:round/>
+                      <a:headEnd type="none" w="med" len="med"/>
+                      <a:tailEnd type="none" w="med" len="med"/>
+                    </a:lnT>
+                    <a:lnB w="12700" cap="flat" cmpd="sng" algn="ctr">
+                      <a:solidFill>
+                        <a:schemeClr val="tx1"/>
+                      </a:solidFill>
+                      <a:prstDash val="solid"/>
+                      <a:round/>
+                      <a:headEnd type="none" w="med" len="med"/>
+                      <a:tailEnd type="none" w="med" len="med"/>
+                    </a:lnB>
+                  </a:tcPr>
+                </a:tc>
+                <a:extLst>
+                  <a:ext uri="{0D108BD9-81ED-4DB2-BD59-A6C34878D82A}">
+                    <a16:rowId xmlns:a16="http://schemas.microsoft.com/office/drawing/2014/main" val="3647233555"/>
+                  </a:ext>
+                </a:extLst>
+              </a:tr>
+            </a:tbl>
+          </a:graphicData>
+        </a:graphic>
+      </p:graphicFrame>
+      <p:graphicFrame>
+        <p:nvGraphicFramePr>
+          <p:cNvPr id="7" name="Table 6">
+            <a:extLst>
+              <a:ext uri="{FF2B5EF4-FFF2-40B4-BE49-F238E27FC236}">
+                <a16:creationId xmlns:a16="http://schemas.microsoft.com/office/drawing/2014/main" id="{F59518AF-6A7E-4D8D-B6FF-88A4D3389312}"/>
+              </a:ext>
+            </a:extLst>
+          </p:cNvPr>
+          <p:cNvGraphicFramePr>
+            <a:graphicFrameLocks noGrp="1"/>
+          </p:cNvGraphicFramePr>
+          <p:nvPr>
+            <p:extLst>
+              <p:ext uri="{D42A27DB-BD31-4B8C-83A1-F6EECF244321}">
+                <p14:modId xmlns:p14="http://schemas.microsoft.com/office/powerpoint/2010/main" val="147274827"/>
+              </p:ext>
+            </p:extLst>
+          </p:nvPr>
+        </p:nvGraphicFramePr>
+        <p:xfrm>
+          <a:off x="4792780" y="866734"/>
+          <a:ext cx="1665610" cy="472440"/>
+        </p:xfrm>
+        <a:graphic>
+          <a:graphicData uri="http://schemas.openxmlformats.org/drawingml/2006/table">
+            <a:tbl>
+              <a:tblPr firstRow="1" bandRow="1">
+                <a:tableStyleId>{00A15C55-8517-42AA-B614-E9B94910E393}</a:tableStyleId>
+              </a:tblPr>
+              <a:tblGrid>
+                <a:gridCol w="1665610">
+                  <a:extLst>
+                    <a:ext uri="{9D8B030D-6E8A-4147-A177-3AD203B41FA5}">
+                      <a16:colId xmlns:a16="http://schemas.microsoft.com/office/drawing/2014/main" val="1895854942"/>
+                    </a:ext>
+                  </a:extLst>
+                </a:gridCol>
+              </a:tblGrid>
+              <a:tr h="389355">
+                <a:tc>
+                  <a:txBody>
+                    <a:bodyPr/>
+                    <a:lstStyle/>
+                    <a:p>
+                      <a:pPr algn="ctr"/>
+                      <a:r>
+                        <a:rPr lang="it-IT" sz="2500" dirty="0">
+                          <a:solidFill>
+                            <a:schemeClr val="tx1"/>
+                          </a:solidFill>
+                        </a:rPr>
+                        <a:t>Material</a:t>
+                      </a:r>
+                    </a:p>
+                  </a:txBody>
+                  <a:tcPr>
+                    <a:lnL w="12700" cap="flat" cmpd="sng" algn="ctr">
+                      <a:solidFill>
+                        <a:schemeClr val="tx1"/>
+                      </a:solidFill>
+                      <a:prstDash val="solid"/>
+                      <a:round/>
+                      <a:headEnd type="none" w="med" len="med"/>
+                      <a:tailEnd type="none" w="med" len="med"/>
+                    </a:lnL>
+                    <a:lnR w="12700" cap="flat" cmpd="sng" algn="ctr">
+                      <a:solidFill>
+                        <a:schemeClr val="tx1"/>
+                      </a:solidFill>
+                      <a:prstDash val="solid"/>
+                      <a:round/>
+                      <a:headEnd type="none" w="med" len="med"/>
+                      <a:tailEnd type="none" w="med" len="med"/>
+                    </a:lnR>
+                    <a:lnT w="12700" cap="flat" cmpd="sng" algn="ctr">
+                      <a:solidFill>
+                        <a:schemeClr val="tx1"/>
+                      </a:solidFill>
+                      <a:prstDash val="solid"/>
+                      <a:round/>
+                      <a:headEnd type="none" w="med" len="med"/>
+                      <a:tailEnd type="none" w="med" len="med"/>
+                    </a:lnT>
+                    <a:lnB w="12700" cap="flat" cmpd="sng" algn="ctr">
+                      <a:solidFill>
+                        <a:schemeClr val="tx1"/>
+                      </a:solidFill>
+                      <a:prstDash val="solid"/>
+                      <a:round/>
+                      <a:headEnd type="none" w="med" len="med"/>
+                      <a:tailEnd type="none" w="med" len="med"/>
+                    </a:lnB>
+                  </a:tcPr>
+                </a:tc>
+                <a:extLst>
+                  <a:ext uri="{0D108BD9-81ED-4DB2-BD59-A6C34878D82A}">
+                    <a16:rowId xmlns:a16="http://schemas.microsoft.com/office/drawing/2014/main" val="3647233555"/>
+                  </a:ext>
+                </a:extLst>
+              </a:tr>
+            </a:tbl>
+          </a:graphicData>
+        </a:graphic>
+      </p:graphicFrame>
+      <p:graphicFrame>
+        <p:nvGraphicFramePr>
+          <p:cNvPr id="8" name="Table 7">
+            <a:extLst>
+              <a:ext uri="{FF2B5EF4-FFF2-40B4-BE49-F238E27FC236}">
+                <a16:creationId xmlns:a16="http://schemas.microsoft.com/office/drawing/2014/main" id="{CF4B15EA-2D6B-4DB5-BDD7-7EC3DD797BCC}"/>
+              </a:ext>
+            </a:extLst>
+          </p:cNvPr>
+          <p:cNvGraphicFramePr>
+            <a:graphicFrameLocks noGrp="1"/>
+          </p:cNvGraphicFramePr>
+          <p:nvPr>
+            <p:extLst>
+              <p:ext uri="{D42A27DB-BD31-4B8C-83A1-F6EECF244321}">
+                <p14:modId xmlns:p14="http://schemas.microsoft.com/office/powerpoint/2010/main" val="2025239666"/>
+              </p:ext>
+            </p:extLst>
+          </p:nvPr>
+        </p:nvGraphicFramePr>
+        <p:xfrm>
+          <a:off x="6526574" y="866729"/>
+          <a:ext cx="2428873" cy="472440"/>
+        </p:xfrm>
+        <a:graphic>
+          <a:graphicData uri="http://schemas.openxmlformats.org/drawingml/2006/table">
+            <a:tbl>
+              <a:tblPr firstRow="1" bandRow="1">
+                <a:tableStyleId>{00A15C55-8517-42AA-B614-E9B94910E393}</a:tableStyleId>
+              </a:tblPr>
+              <a:tblGrid>
+                <a:gridCol w="2428873">
+                  <a:extLst>
+                    <a:ext uri="{9D8B030D-6E8A-4147-A177-3AD203B41FA5}">
+                      <a16:colId xmlns:a16="http://schemas.microsoft.com/office/drawing/2014/main" val="1895854942"/>
+                    </a:ext>
+                  </a:extLst>
+                </a:gridCol>
+              </a:tblGrid>
+              <a:tr h="389355">
+                <a:tc>
+                  <a:txBody>
+                    <a:bodyPr/>
+                    <a:lstStyle/>
+                    <a:p>
+                      <a:pPr algn="ctr"/>
+                      <a:r>
+                        <a:rPr lang="it-IT" sz="2500" dirty="0">
+                          <a:solidFill>
+                            <a:schemeClr val="tx1"/>
+                          </a:solidFill>
+                        </a:rPr>
+                        <a:t>AirGapMaterial</a:t>
+                      </a:r>
+                    </a:p>
+                  </a:txBody>
+                  <a:tcPr>
+                    <a:lnL w="12700" cap="flat" cmpd="sng" algn="ctr">
+                      <a:solidFill>
+                        <a:schemeClr val="tx1"/>
+                      </a:solidFill>
+                      <a:prstDash val="solid"/>
+                      <a:round/>
+                      <a:headEnd type="none" w="med" len="med"/>
+                      <a:tailEnd type="none" w="med" len="med"/>
+                    </a:lnL>
+                    <a:lnR w="12700" cap="flat" cmpd="sng" algn="ctr">
+                      <a:solidFill>
+                        <a:schemeClr val="tx1"/>
+                      </a:solidFill>
+                      <a:prstDash val="solid"/>
+                      <a:round/>
+                      <a:headEnd type="none" w="med" len="med"/>
+                      <a:tailEnd type="none" w="med" len="med"/>
+                    </a:lnR>
+                    <a:lnT w="12700" cap="flat" cmpd="sng" algn="ctr">
+                      <a:solidFill>
+                        <a:schemeClr val="tx1"/>
+                      </a:solidFill>
+                      <a:prstDash val="solid"/>
+                      <a:round/>
+                      <a:headEnd type="none" w="med" len="med"/>
+                      <a:tailEnd type="none" w="med" len="med"/>
+                    </a:lnT>
+                    <a:lnB w="12700" cap="flat" cmpd="sng" algn="ctr">
+                      <a:solidFill>
+                        <a:schemeClr val="tx1"/>
+                      </a:solidFill>
+                      <a:prstDash val="solid"/>
+                      <a:round/>
+                      <a:headEnd type="none" w="med" len="med"/>
+                      <a:tailEnd type="none" w="med" len="med"/>
+                    </a:lnB>
+                  </a:tcPr>
+                </a:tc>
+                <a:extLst>
+                  <a:ext uri="{0D108BD9-81ED-4DB2-BD59-A6C34878D82A}">
+                    <a16:rowId xmlns:a16="http://schemas.microsoft.com/office/drawing/2014/main" val="3647233555"/>
+                  </a:ext>
+                </a:extLst>
+              </a:tr>
+            </a:tbl>
+          </a:graphicData>
+        </a:graphic>
+      </p:graphicFrame>
+      <p:graphicFrame>
+        <p:nvGraphicFramePr>
+          <p:cNvPr id="9" name="Table 8">
+            <a:extLst>
+              <a:ext uri="{FF2B5EF4-FFF2-40B4-BE49-F238E27FC236}">
+                <a16:creationId xmlns:a16="http://schemas.microsoft.com/office/drawing/2014/main" id="{767ACD3B-50D7-484A-BCDF-AB374AFA2279}"/>
+              </a:ext>
+            </a:extLst>
+          </p:cNvPr>
+          <p:cNvGraphicFramePr>
+            <a:graphicFrameLocks noGrp="1"/>
+          </p:cNvGraphicFramePr>
+          <p:nvPr>
+            <p:extLst>
+              <p:ext uri="{D42A27DB-BD31-4B8C-83A1-F6EECF244321}">
+                <p14:modId xmlns:p14="http://schemas.microsoft.com/office/powerpoint/2010/main" val="580524747"/>
+              </p:ext>
+            </p:extLst>
+          </p:nvPr>
+        </p:nvGraphicFramePr>
+        <p:xfrm>
+          <a:off x="5716324" y="1904147"/>
+          <a:ext cx="1998732" cy="472440"/>
+        </p:xfrm>
+        <a:graphic>
+          <a:graphicData uri="http://schemas.openxmlformats.org/drawingml/2006/table">
+            <a:tbl>
+              <a:tblPr firstRow="1" bandRow="1">
+                <a:tableStyleId>{00A15C55-8517-42AA-B614-E9B94910E393}</a:tableStyleId>
+              </a:tblPr>
+              <a:tblGrid>
+                <a:gridCol w="1998732">
+                  <a:extLst>
+                    <a:ext uri="{9D8B030D-6E8A-4147-A177-3AD203B41FA5}">
+                      <a16:colId xmlns:a16="http://schemas.microsoft.com/office/drawing/2014/main" val="1895854942"/>
+                    </a:ext>
+                  </a:extLst>
+                </a:gridCol>
+              </a:tblGrid>
+              <a:tr h="389355">
+                <a:tc>
+                  <a:txBody>
+                    <a:bodyPr/>
+                    <a:lstStyle/>
+                    <a:p>
+                      <a:pPr algn="ctr"/>
+                      <a:r>
+                        <a:rPr lang="it-IT" sz="2500" dirty="0">
+                          <a:solidFill>
+                            <a:schemeClr val="tx1"/>
+                          </a:solidFill>
+                        </a:rPr>
+                        <a:t>Construction</a:t>
+                      </a:r>
+                    </a:p>
+                  </a:txBody>
+                  <a:tcPr>
+                    <a:lnL w="12700" cap="flat" cmpd="sng" algn="ctr">
+                      <a:solidFill>
+                        <a:schemeClr val="tx1"/>
+                      </a:solidFill>
+                      <a:prstDash val="solid"/>
+                      <a:round/>
+                      <a:headEnd type="none" w="med" len="med"/>
+                      <a:tailEnd type="none" w="med" len="med"/>
+                    </a:lnL>
+                    <a:lnR w="12700" cap="flat" cmpd="sng" algn="ctr">
+                      <a:solidFill>
+                        <a:schemeClr val="tx1"/>
+                      </a:solidFill>
+                      <a:prstDash val="solid"/>
+                      <a:round/>
+                      <a:headEnd type="none" w="med" len="med"/>
+                      <a:tailEnd type="none" w="med" len="med"/>
+                    </a:lnR>
+                    <a:lnT w="12700" cap="flat" cmpd="sng" algn="ctr">
+                      <a:solidFill>
+                        <a:schemeClr val="tx1"/>
+                      </a:solidFill>
+                      <a:prstDash val="solid"/>
+                      <a:round/>
+                      <a:headEnd type="none" w="med" len="med"/>
+                      <a:tailEnd type="none" w="med" len="med"/>
+                    </a:lnT>
+                    <a:lnB w="12700" cap="flat" cmpd="sng" algn="ctr">
+                      <a:solidFill>
+                        <a:schemeClr val="tx1"/>
+                      </a:solidFill>
+                      <a:prstDash val="solid"/>
+                      <a:round/>
+                      <a:headEnd type="none" w="med" len="med"/>
+                      <a:tailEnd type="none" w="med" len="med"/>
+                    </a:lnB>
+                  </a:tcPr>
+                </a:tc>
+                <a:extLst>
+                  <a:ext uri="{0D108BD9-81ED-4DB2-BD59-A6C34878D82A}">
+                    <a16:rowId xmlns:a16="http://schemas.microsoft.com/office/drawing/2014/main" val="3647233555"/>
+                  </a:ext>
+                </a:extLst>
+              </a:tr>
+            </a:tbl>
+          </a:graphicData>
+        </a:graphic>
+      </p:graphicFrame>
+      <p:cxnSp>
+        <p:nvCxnSpPr>
+          <p:cNvPr id="11" name="Connector: Elbow 10">
+            <a:extLst>
+              <a:ext uri="{FF2B5EF4-FFF2-40B4-BE49-F238E27FC236}">
+                <a16:creationId xmlns:a16="http://schemas.microsoft.com/office/drawing/2014/main" id="{5E44F4FE-AB57-4C64-A13B-57B462022B27}"/>
+              </a:ext>
+            </a:extLst>
+          </p:cNvPr>
+          <p:cNvCxnSpPr>
+            <a:cxnSpLocks/>
+            <a:stCxn id="9" idx="0"/>
+            <a:endCxn id="7" idx="2"/>
+          </p:cNvCxnSpPr>
+          <p:nvPr/>
+        </p:nvCxnSpPr>
+        <p:spPr>
+          <a:xfrm rot="16200000" flipV="1">
+            <a:off x="5888152" y="1076608"/>
+            <a:ext cx="564973" cy="1090105"/>
+          </a:xfrm>
+          <a:prstGeom prst="bentConnector3">
+            <a:avLst>
+              <a:gd name="adj1" fmla="val 50000"/>
+            </a:avLst>
+          </a:prstGeom>
+          <a:ln>
+            <a:solidFill>
+              <a:schemeClr val="tx1"/>
+            </a:solidFill>
+            <a:tailEnd type="triangle"/>
+          </a:ln>
+        </p:spPr>
+        <p:style>
+          <a:lnRef idx="1">
+            <a:schemeClr val="accent1"/>
+          </a:lnRef>
+          <a:fillRef idx="0">
+            <a:schemeClr val="accent1"/>
+          </a:fillRef>
+          <a:effectRef idx="0">
+            <a:schemeClr val="accent1"/>
+          </a:effectRef>
+          <a:fontRef idx="minor">
+            <a:schemeClr val="tx1"/>
+          </a:fontRef>
+        </p:style>
+      </p:cxnSp>
+      <p:cxnSp>
+        <p:nvCxnSpPr>
+          <p:cNvPr id="13" name="Connector: Elbow 12">
+            <a:extLst>
+              <a:ext uri="{FF2B5EF4-FFF2-40B4-BE49-F238E27FC236}">
+                <a16:creationId xmlns:a16="http://schemas.microsoft.com/office/drawing/2014/main" id="{2E8A469A-CF75-48E7-AFD7-6ECE285DC06E}"/>
+              </a:ext>
+            </a:extLst>
+          </p:cNvPr>
+          <p:cNvCxnSpPr>
+            <a:cxnSpLocks/>
+            <a:stCxn id="9" idx="0"/>
+            <a:endCxn id="8" idx="2"/>
+          </p:cNvCxnSpPr>
+          <p:nvPr/>
+        </p:nvCxnSpPr>
+        <p:spPr>
+          <a:xfrm rot="5400000" flipH="1" flipV="1">
+            <a:off x="6945861" y="1108998"/>
+            <a:ext cx="564978" cy="1025320"/>
+          </a:xfrm>
+          <a:prstGeom prst="bentConnector3">
+            <a:avLst>
+              <a:gd name="adj1" fmla="val 50000"/>
+            </a:avLst>
+          </a:prstGeom>
+          <a:ln>
+            <a:solidFill>
+              <a:schemeClr val="tx1"/>
+            </a:solidFill>
+            <a:tailEnd type="triangle"/>
+          </a:ln>
+        </p:spPr>
+        <p:style>
+          <a:lnRef idx="1">
+            <a:schemeClr val="accent1"/>
+          </a:lnRef>
+          <a:fillRef idx="0">
+            <a:schemeClr val="accent1"/>
+          </a:fillRef>
+          <a:effectRef idx="0">
+            <a:schemeClr val="accent1"/>
+          </a:effectRef>
+          <a:fontRef idx="minor">
+            <a:schemeClr val="tx1"/>
+          </a:fontRef>
+        </p:style>
+      </p:cxnSp>
+      <p:cxnSp>
+        <p:nvCxnSpPr>
+          <p:cNvPr id="16" name="Connector: Elbow 15">
+            <a:extLst>
+              <a:ext uri="{FF2B5EF4-FFF2-40B4-BE49-F238E27FC236}">
+                <a16:creationId xmlns:a16="http://schemas.microsoft.com/office/drawing/2014/main" id="{CB8C387A-8D61-49C7-A9D5-DD38FAF0C867}"/>
+              </a:ext>
+            </a:extLst>
+          </p:cNvPr>
+          <p:cNvCxnSpPr>
+            <a:cxnSpLocks/>
+            <a:stCxn id="5" idx="0"/>
+            <a:endCxn id="6" idx="2"/>
+          </p:cNvCxnSpPr>
+          <p:nvPr/>
+        </p:nvCxnSpPr>
+        <p:spPr>
+          <a:xfrm rot="16200000" flipV="1">
+            <a:off x="2919131" y="2015199"/>
+            <a:ext cx="1359155" cy="7097"/>
+          </a:xfrm>
+          <a:prstGeom prst="bentConnector3">
+            <a:avLst>
+              <a:gd name="adj1" fmla="val 50000"/>
+            </a:avLst>
+          </a:prstGeom>
+          <a:ln>
+            <a:solidFill>
+              <a:schemeClr val="tx1"/>
+            </a:solidFill>
+            <a:tailEnd type="triangle"/>
+          </a:ln>
+        </p:spPr>
+        <p:style>
+          <a:lnRef idx="1">
+            <a:schemeClr val="accent1"/>
+          </a:lnRef>
+          <a:fillRef idx="0">
+            <a:schemeClr val="accent1"/>
+          </a:fillRef>
+          <a:effectRef idx="0">
+            <a:schemeClr val="accent1"/>
+          </a:effectRef>
+          <a:fontRef idx="minor">
+            <a:schemeClr val="tx1"/>
+          </a:fontRef>
+        </p:style>
+      </p:cxnSp>
+      <p:cxnSp>
+        <p:nvCxnSpPr>
+          <p:cNvPr id="29" name="Connector: Elbow 28">
+            <a:extLst>
+              <a:ext uri="{FF2B5EF4-FFF2-40B4-BE49-F238E27FC236}">
+                <a16:creationId xmlns:a16="http://schemas.microsoft.com/office/drawing/2014/main" id="{972B0DDD-7143-4844-8A04-E3EEB9D8EA45}"/>
+              </a:ext>
+            </a:extLst>
+          </p:cNvPr>
+          <p:cNvCxnSpPr>
+            <a:cxnSpLocks/>
+            <a:stCxn id="5" idx="0"/>
+            <a:endCxn id="7" idx="2"/>
+          </p:cNvCxnSpPr>
+          <p:nvPr/>
+        </p:nvCxnSpPr>
+        <p:spPr>
+          <a:xfrm rot="5400000" flipH="1" flipV="1">
+            <a:off x="3934345" y="1007086"/>
+            <a:ext cx="1359151" cy="2023329"/>
+          </a:xfrm>
+          <a:prstGeom prst="bentConnector3">
+            <a:avLst>
+              <a:gd name="adj1" fmla="val 50000"/>
+            </a:avLst>
+          </a:prstGeom>
+          <a:ln>
+            <a:solidFill>
+              <a:schemeClr val="tx1"/>
+            </a:solidFill>
+            <a:tailEnd type="triangle"/>
+          </a:ln>
+        </p:spPr>
+        <p:style>
+          <a:lnRef idx="1">
+            <a:schemeClr val="accent1"/>
+          </a:lnRef>
+          <a:fillRef idx="0">
+            <a:schemeClr val="accent1"/>
+          </a:fillRef>
+          <a:effectRef idx="0">
+            <a:schemeClr val="accent1"/>
+          </a:effectRef>
+          <a:fontRef idx="minor">
+            <a:schemeClr val="tx1"/>
+          </a:fontRef>
+        </p:style>
+      </p:cxnSp>
+      <p:cxnSp>
+        <p:nvCxnSpPr>
+          <p:cNvPr id="33" name="Connector: Elbow 32">
+            <a:extLst>
+              <a:ext uri="{FF2B5EF4-FFF2-40B4-BE49-F238E27FC236}">
+                <a16:creationId xmlns:a16="http://schemas.microsoft.com/office/drawing/2014/main" id="{DDFBE83F-5634-4A62-A432-C8F0DE284F3D}"/>
+              </a:ext>
+            </a:extLst>
+          </p:cNvPr>
+          <p:cNvCxnSpPr>
+            <a:cxnSpLocks/>
+            <a:stCxn id="5" idx="0"/>
+            <a:endCxn id="9" idx="2"/>
+          </p:cNvCxnSpPr>
+          <p:nvPr/>
+        </p:nvCxnSpPr>
+        <p:spPr>
+          <a:xfrm rot="5400000" flipH="1" flipV="1">
+            <a:off x="4998104" y="980739"/>
+            <a:ext cx="321738" cy="3113434"/>
+          </a:xfrm>
+          <a:prstGeom prst="bentConnector3">
+            <a:avLst>
+              <a:gd name="adj1" fmla="val 50000"/>
+            </a:avLst>
+          </a:prstGeom>
+          <a:ln>
+            <a:solidFill>
+              <a:schemeClr val="tx1"/>
+            </a:solidFill>
+            <a:tailEnd type="triangle"/>
+          </a:ln>
+        </p:spPr>
+        <p:style>
+          <a:lnRef idx="1">
+            <a:schemeClr val="accent1"/>
+          </a:lnRef>
+          <a:fillRef idx="0">
+            <a:schemeClr val="accent1"/>
+          </a:fillRef>
+          <a:effectRef idx="0">
+            <a:schemeClr val="accent1"/>
+          </a:effectRef>
+          <a:fontRef idx="minor">
+            <a:schemeClr val="tx1"/>
+          </a:fontRef>
+        </p:style>
+      </p:cxnSp>
+      <p:graphicFrame>
+        <p:nvGraphicFramePr>
+          <p:cNvPr id="37" name="Table 36">
+            <a:extLst>
+              <a:ext uri="{FF2B5EF4-FFF2-40B4-BE49-F238E27FC236}">
+                <a16:creationId xmlns:a16="http://schemas.microsoft.com/office/drawing/2014/main" id="{D25E7721-AA99-4E75-AC33-4AA53A24027E}"/>
+              </a:ext>
+            </a:extLst>
+          </p:cNvPr>
+          <p:cNvGraphicFramePr>
+            <a:graphicFrameLocks noGrp="1"/>
+          </p:cNvGraphicFramePr>
+          <p:nvPr>
+            <p:extLst>
+              <p:ext uri="{D42A27DB-BD31-4B8C-83A1-F6EECF244321}">
+                <p14:modId xmlns:p14="http://schemas.microsoft.com/office/powerpoint/2010/main" val="3543502916"/>
+              </p:ext>
+            </p:extLst>
+          </p:nvPr>
+        </p:nvGraphicFramePr>
+        <p:xfrm>
+          <a:off x="4922995" y="2699041"/>
+          <a:ext cx="2311614" cy="472440"/>
+        </p:xfrm>
+        <a:graphic>
+          <a:graphicData uri="http://schemas.openxmlformats.org/drawingml/2006/table">
+            <a:tbl>
+              <a:tblPr firstRow="1" bandRow="1">
+                <a:tableStyleId>{00A15C55-8517-42AA-B614-E9B94910E393}</a:tableStyleId>
+              </a:tblPr>
+              <a:tblGrid>
+                <a:gridCol w="2311614">
+                  <a:extLst>
+                    <a:ext uri="{9D8B030D-6E8A-4147-A177-3AD203B41FA5}">
+                      <a16:colId xmlns:a16="http://schemas.microsoft.com/office/drawing/2014/main" val="1895854942"/>
+                    </a:ext>
+                  </a:extLst>
+                </a:gridCol>
+              </a:tblGrid>
+              <a:tr h="389355">
+                <a:tc>
+                  <a:txBody>
+                    <a:bodyPr/>
+                    <a:lstStyle/>
+                    <a:p>
+                      <a:pPr algn="ctr"/>
+                      <a:r>
+                        <a:rPr lang="it-IT" sz="2500" dirty="0">
+                          <a:solidFill>
+                            <a:schemeClr val="tx1"/>
+                          </a:solidFill>
+                        </a:rPr>
+                        <a:t>Surface</a:t>
+                      </a:r>
+                    </a:p>
+                  </a:txBody>
+                  <a:tcPr>
+                    <a:lnL w="12700" cap="flat" cmpd="sng" algn="ctr">
+                      <a:solidFill>
+                        <a:schemeClr val="tx1"/>
+                      </a:solidFill>
+                      <a:prstDash val="solid"/>
+                      <a:round/>
+                      <a:headEnd type="none" w="med" len="med"/>
+                      <a:tailEnd type="none" w="med" len="med"/>
+                    </a:lnL>
+                    <a:lnR w="12700" cap="flat" cmpd="sng" algn="ctr">
+                      <a:solidFill>
+                        <a:schemeClr val="tx1"/>
+                      </a:solidFill>
+                      <a:prstDash val="solid"/>
+                      <a:round/>
+                      <a:headEnd type="none" w="med" len="med"/>
+                      <a:tailEnd type="none" w="med" len="med"/>
+                    </a:lnR>
+                    <a:lnT w="12700" cap="flat" cmpd="sng" algn="ctr">
+                      <a:solidFill>
+                        <a:schemeClr val="tx1"/>
+                      </a:solidFill>
+                      <a:prstDash val="solid"/>
+                      <a:round/>
+                      <a:headEnd type="none" w="med" len="med"/>
+                      <a:tailEnd type="none" w="med" len="med"/>
+                    </a:lnT>
+                    <a:lnB w="12700" cap="flat" cmpd="sng" algn="ctr">
+                      <a:solidFill>
+                        <a:schemeClr val="tx1"/>
+                      </a:solidFill>
+                      <a:prstDash val="solid"/>
+                      <a:round/>
+                      <a:headEnd type="none" w="med" len="med"/>
+                      <a:tailEnd type="none" w="med" len="med"/>
+                    </a:lnB>
+                  </a:tcPr>
+                </a:tc>
+                <a:extLst>
+                  <a:ext uri="{0D108BD9-81ED-4DB2-BD59-A6C34878D82A}">
+                    <a16:rowId xmlns:a16="http://schemas.microsoft.com/office/drawing/2014/main" val="3647233555"/>
+                  </a:ext>
+                </a:extLst>
+              </a:tr>
+            </a:tbl>
+          </a:graphicData>
+        </a:graphic>
+      </p:graphicFrame>
+      <p:graphicFrame>
+        <p:nvGraphicFramePr>
+          <p:cNvPr id="38" name="Table 37">
+            <a:extLst>
+              <a:ext uri="{FF2B5EF4-FFF2-40B4-BE49-F238E27FC236}">
+                <a16:creationId xmlns:a16="http://schemas.microsoft.com/office/drawing/2014/main" id="{7497A5B2-9EDC-41D9-8F3A-B747DE73C50E}"/>
+              </a:ext>
+            </a:extLst>
+          </p:cNvPr>
+          <p:cNvGraphicFramePr>
+            <a:graphicFrameLocks noGrp="1"/>
+          </p:cNvGraphicFramePr>
+          <p:nvPr>
+            <p:extLst>
+              <p:ext uri="{D42A27DB-BD31-4B8C-83A1-F6EECF244321}">
+                <p14:modId xmlns:p14="http://schemas.microsoft.com/office/powerpoint/2010/main" val="2813079565"/>
+              </p:ext>
+            </p:extLst>
+          </p:nvPr>
+        </p:nvGraphicFramePr>
+        <p:xfrm>
+          <a:off x="7462546" y="2699038"/>
+          <a:ext cx="2311614" cy="853440"/>
+        </p:xfrm>
+        <a:graphic>
+          <a:graphicData uri="http://schemas.openxmlformats.org/drawingml/2006/table">
+            <a:tbl>
+              <a:tblPr firstRow="1" bandRow="1">
+                <a:tableStyleId>{00A15C55-8517-42AA-B614-E9B94910E393}</a:tableStyleId>
+              </a:tblPr>
+              <a:tblGrid>
+                <a:gridCol w="2311614">
+                  <a:extLst>
+                    <a:ext uri="{9D8B030D-6E8A-4147-A177-3AD203B41FA5}">
+                      <a16:colId xmlns:a16="http://schemas.microsoft.com/office/drawing/2014/main" val="1895854942"/>
+                    </a:ext>
+                  </a:extLst>
+                </a:gridCol>
+              </a:tblGrid>
+              <a:tr h="389355">
+                <a:tc>
+                  <a:txBody>
+                    <a:bodyPr/>
+                    <a:lstStyle/>
+                    <a:p>
+                      <a:pPr algn="ctr"/>
+                      <a:r>
+                        <a:rPr lang="it-IT" sz="2500" dirty="0">
+                          <a:solidFill>
+                            <a:schemeClr val="tx1"/>
+                          </a:solidFill>
+                        </a:rPr>
+                        <a:t>SurfaceInternalMass</a:t>
+                      </a:r>
+                    </a:p>
+                  </a:txBody>
+                  <a:tcPr>
+                    <a:lnL w="12700" cap="flat" cmpd="sng" algn="ctr">
+                      <a:solidFill>
+                        <a:schemeClr val="tx1"/>
+                      </a:solidFill>
+                      <a:prstDash val="solid"/>
+                      <a:round/>
+                      <a:headEnd type="none" w="med" len="med"/>
+                      <a:tailEnd type="none" w="med" len="med"/>
+                    </a:lnL>
+                    <a:lnR w="12700" cap="flat" cmpd="sng" algn="ctr">
+                      <a:solidFill>
+                        <a:schemeClr val="tx1"/>
+                      </a:solidFill>
+                      <a:prstDash val="solid"/>
+                      <a:round/>
+                      <a:headEnd type="none" w="med" len="med"/>
+                      <a:tailEnd type="none" w="med" len="med"/>
+                    </a:lnR>
+                    <a:lnT w="12700" cap="flat" cmpd="sng" algn="ctr">
+                      <a:solidFill>
+                        <a:schemeClr val="tx1"/>
+                      </a:solidFill>
+                      <a:prstDash val="solid"/>
+                      <a:round/>
+                      <a:headEnd type="none" w="med" len="med"/>
+                      <a:tailEnd type="none" w="med" len="med"/>
+                    </a:lnT>
+                    <a:lnB w="12700" cap="flat" cmpd="sng" algn="ctr">
+                      <a:solidFill>
+                        <a:schemeClr val="tx1"/>
+                      </a:solidFill>
+                      <a:prstDash val="solid"/>
+                      <a:round/>
+                      <a:headEnd type="none" w="med" len="med"/>
+                      <a:tailEnd type="none" w="med" len="med"/>
+                    </a:lnB>
+                  </a:tcPr>
+                </a:tc>
+                <a:extLst>
+                  <a:ext uri="{0D108BD9-81ED-4DB2-BD59-A6C34878D82A}">
+                    <a16:rowId xmlns:a16="http://schemas.microsoft.com/office/drawing/2014/main" val="3647233555"/>
+                  </a:ext>
+                </a:extLst>
+              </a:tr>
+            </a:tbl>
+          </a:graphicData>
+        </a:graphic>
+      </p:graphicFrame>
+      <p:cxnSp>
+        <p:nvCxnSpPr>
+          <p:cNvPr id="39" name="Connector: Elbow 38">
+            <a:extLst>
+              <a:ext uri="{FF2B5EF4-FFF2-40B4-BE49-F238E27FC236}">
+                <a16:creationId xmlns:a16="http://schemas.microsoft.com/office/drawing/2014/main" id="{D937C73D-EFD7-422A-85CB-72AAC3C6DD96}"/>
+              </a:ext>
+            </a:extLst>
+          </p:cNvPr>
+          <p:cNvCxnSpPr>
+            <a:cxnSpLocks/>
+            <a:stCxn id="37" idx="0"/>
+            <a:endCxn id="9" idx="2"/>
+          </p:cNvCxnSpPr>
+          <p:nvPr/>
+        </p:nvCxnSpPr>
+        <p:spPr>
+          <a:xfrm rot="5400000" flipH="1" flipV="1">
+            <a:off x="6236019" y="2219370"/>
+            <a:ext cx="322454" cy="636888"/>
+          </a:xfrm>
+          <a:prstGeom prst="bentConnector3">
+            <a:avLst>
+              <a:gd name="adj1" fmla="val 50000"/>
+            </a:avLst>
+          </a:prstGeom>
+          <a:ln>
+            <a:solidFill>
+              <a:schemeClr val="accent6">
+                <a:lumMod val="75000"/>
+              </a:schemeClr>
+            </a:solidFill>
+            <a:tailEnd type="triangle"/>
+          </a:ln>
+        </p:spPr>
+        <p:style>
+          <a:lnRef idx="1">
+            <a:schemeClr val="accent1"/>
+          </a:lnRef>
+          <a:fillRef idx="0">
+            <a:schemeClr val="accent1"/>
+          </a:fillRef>
+          <a:effectRef idx="0">
+            <a:schemeClr val="accent1"/>
+          </a:effectRef>
+          <a:fontRef idx="minor">
+            <a:schemeClr val="tx1"/>
+          </a:fontRef>
+        </p:style>
+      </p:cxnSp>
+      <p:cxnSp>
+        <p:nvCxnSpPr>
+          <p:cNvPr id="42" name="Connector: Elbow 41">
+            <a:extLst>
+              <a:ext uri="{FF2B5EF4-FFF2-40B4-BE49-F238E27FC236}">
+                <a16:creationId xmlns:a16="http://schemas.microsoft.com/office/drawing/2014/main" id="{5A1ED928-DC75-464C-9646-256FAB471773}"/>
+              </a:ext>
+            </a:extLst>
+          </p:cNvPr>
+          <p:cNvCxnSpPr>
+            <a:cxnSpLocks/>
+            <a:stCxn id="38" idx="0"/>
+            <a:endCxn id="9" idx="2"/>
+          </p:cNvCxnSpPr>
+          <p:nvPr/>
+        </p:nvCxnSpPr>
+        <p:spPr>
+          <a:xfrm rot="16200000" flipV="1">
+            <a:off x="7505797" y="1586481"/>
+            <a:ext cx="322451" cy="1902663"/>
+          </a:xfrm>
+          <a:prstGeom prst="bentConnector3">
+            <a:avLst>
+              <a:gd name="adj1" fmla="val 50000"/>
+            </a:avLst>
+          </a:prstGeom>
+          <a:ln>
+            <a:solidFill>
+              <a:schemeClr val="tx1"/>
+            </a:solidFill>
+            <a:tailEnd type="triangle"/>
+          </a:ln>
+        </p:spPr>
+        <p:style>
+          <a:lnRef idx="1">
+            <a:schemeClr val="accent1"/>
+          </a:lnRef>
+          <a:fillRef idx="0">
+            <a:schemeClr val="accent1"/>
+          </a:fillRef>
+          <a:effectRef idx="0">
+            <a:schemeClr val="accent1"/>
+          </a:effectRef>
+          <a:fontRef idx="minor">
+            <a:schemeClr val="tx1"/>
+          </a:fontRef>
+        </p:style>
+      </p:cxnSp>
+      <p:graphicFrame>
+        <p:nvGraphicFramePr>
+          <p:cNvPr id="67" name="Table 66">
+            <a:extLst>
+              <a:ext uri="{FF2B5EF4-FFF2-40B4-BE49-F238E27FC236}">
+                <a16:creationId xmlns:a16="http://schemas.microsoft.com/office/drawing/2014/main" id="{2B17916C-7500-4379-B452-3BB3DBA9CB55}"/>
+              </a:ext>
+            </a:extLst>
+          </p:cNvPr>
+          <p:cNvGraphicFramePr>
+            <a:graphicFrameLocks noGrp="1"/>
+          </p:cNvGraphicFramePr>
+          <p:nvPr>
+            <p:extLst>
+              <p:ext uri="{D42A27DB-BD31-4B8C-83A1-F6EECF244321}">
+                <p14:modId xmlns:p14="http://schemas.microsoft.com/office/powerpoint/2010/main" val="3226508995"/>
+              </p:ext>
+            </p:extLst>
+          </p:nvPr>
+        </p:nvGraphicFramePr>
+        <p:xfrm>
+          <a:off x="5481346" y="6378270"/>
+          <a:ext cx="3962400" cy="472440"/>
+        </p:xfrm>
+        <a:graphic>
+          <a:graphicData uri="http://schemas.openxmlformats.org/drawingml/2006/table">
+            <a:tbl>
+              <a:tblPr firstRow="1" bandRow="1">
+                <a:tableStyleId>{5C22544A-7EE6-4342-B048-85BDC9FD1C3A}</a:tableStyleId>
+              </a:tblPr>
+              <a:tblGrid>
+                <a:gridCol w="3962400">
+                  <a:extLst>
+                    <a:ext uri="{9D8B030D-6E8A-4147-A177-3AD203B41FA5}">
+                      <a16:colId xmlns:a16="http://schemas.microsoft.com/office/drawing/2014/main" val="1895854942"/>
+                    </a:ext>
+                  </a:extLst>
+                </a:gridCol>
+              </a:tblGrid>
+              <a:tr h="389355">
+                <a:tc>
+                  <a:txBody>
+                    <a:bodyPr/>
+                    <a:lstStyle/>
+                    <a:p>
+                      <a:pPr algn="ctr"/>
+                      <a:r>
+                        <a:rPr lang="it-IT" sz="2500" dirty="0"/>
+                        <a:t>ThermalZone</a:t>
+                      </a:r>
+                      <a:endParaRPr lang="it-IT" sz="2500" dirty="0">
+                        <a:solidFill>
+                          <a:schemeClr val="tx1"/>
+                        </a:solidFill>
+                      </a:endParaRPr>
+                    </a:p>
+                  </a:txBody>
+                  <a:tcPr>
+                    <a:lnL w="12700" cap="flat" cmpd="sng" algn="ctr">
+                      <a:solidFill>
+                        <a:schemeClr val="tx1"/>
+                      </a:solidFill>
+                      <a:prstDash val="solid"/>
+                      <a:round/>
+                      <a:headEnd type="none" w="med" len="med"/>
+                      <a:tailEnd type="none" w="med" len="med"/>
+                    </a:lnL>
+                    <a:lnR w="12700" cap="flat" cmpd="sng" algn="ctr">
+                      <a:solidFill>
+                        <a:schemeClr val="tx1"/>
+                      </a:solidFill>
+                      <a:prstDash val="solid"/>
+                      <a:round/>
+                      <a:headEnd type="none" w="med" len="med"/>
+                      <a:tailEnd type="none" w="med" len="med"/>
+                    </a:lnR>
+                    <a:lnT w="12700" cap="flat" cmpd="sng" algn="ctr">
+                      <a:solidFill>
+                        <a:schemeClr val="tx1"/>
+                      </a:solidFill>
+                      <a:prstDash val="solid"/>
+                      <a:round/>
+                      <a:headEnd type="none" w="med" len="med"/>
+                      <a:tailEnd type="none" w="med" len="med"/>
+                    </a:lnT>
+                    <a:lnB w="12700" cap="flat" cmpd="sng" algn="ctr">
+                      <a:solidFill>
+                        <a:schemeClr val="tx1"/>
+                      </a:solidFill>
+                      <a:prstDash val="solid"/>
+                      <a:round/>
+                      <a:headEnd type="none" w="med" len="med"/>
+                      <a:tailEnd type="none" w="med" len="med"/>
+                    </a:lnB>
+                  </a:tcPr>
+                </a:tc>
+                <a:extLst>
+                  <a:ext uri="{0D108BD9-81ED-4DB2-BD59-A6C34878D82A}">
+                    <a16:rowId xmlns:a16="http://schemas.microsoft.com/office/drawing/2014/main" val="3647233555"/>
+                  </a:ext>
+                </a:extLst>
+              </a:tr>
+            </a:tbl>
+          </a:graphicData>
+        </a:graphic>
+      </p:graphicFrame>
+      <p:graphicFrame>
+        <p:nvGraphicFramePr>
+          <p:cNvPr id="68" name="Table 67">
+            <a:extLst>
+              <a:ext uri="{FF2B5EF4-FFF2-40B4-BE49-F238E27FC236}">
+                <a16:creationId xmlns:a16="http://schemas.microsoft.com/office/drawing/2014/main" id="{55F7F3D4-8985-4E7C-A739-C9C8A47B70EE}"/>
+              </a:ext>
+            </a:extLst>
+          </p:cNvPr>
+          <p:cNvGraphicFramePr>
+            <a:graphicFrameLocks noGrp="1"/>
+          </p:cNvGraphicFramePr>
+          <p:nvPr>
+            <p:extLst>
+              <p:ext uri="{D42A27DB-BD31-4B8C-83A1-F6EECF244321}">
+                <p14:modId xmlns:p14="http://schemas.microsoft.com/office/powerpoint/2010/main" val="1140943559"/>
+              </p:ext>
+            </p:extLst>
+          </p:nvPr>
+        </p:nvGraphicFramePr>
+        <p:xfrm>
+          <a:off x="14449916" y="803553"/>
+          <a:ext cx="1935680" cy="472440"/>
+        </p:xfrm>
+        <a:graphic>
+          <a:graphicData uri="http://schemas.openxmlformats.org/drawingml/2006/table">
+            <a:tbl>
+              <a:tblPr firstRow="1" bandRow="1">
+                <a:tableStyleId>{93296810-A885-4BE3-A3E7-6D5BEEA58F35}</a:tableStyleId>
+              </a:tblPr>
+              <a:tblGrid>
+                <a:gridCol w="1935680">
+                  <a:extLst>
+                    <a:ext uri="{9D8B030D-6E8A-4147-A177-3AD203B41FA5}">
+                      <a16:colId xmlns:a16="http://schemas.microsoft.com/office/drawing/2014/main" val="1895854942"/>
+                    </a:ext>
+                  </a:extLst>
+                </a:gridCol>
+              </a:tblGrid>
+              <a:tr h="441601">
+                <a:tc>
+                  <a:txBody>
+                    <a:bodyPr/>
+                    <a:lstStyle/>
+                    <a:p>
+                      <a:pPr algn="ctr"/>
+                      <a:r>
+                        <a:rPr lang="it-IT" sz="2500" dirty="0"/>
+                        <a:t>Schedule</a:t>
+                      </a:r>
+                      <a:endParaRPr lang="it-IT" sz="2500" dirty="0">
+                        <a:solidFill>
+                          <a:schemeClr val="tx1"/>
+                        </a:solidFill>
+                      </a:endParaRPr>
+                    </a:p>
+                  </a:txBody>
+                  <a:tcPr>
+                    <a:lnL w="12700" cap="flat" cmpd="sng" algn="ctr">
+                      <a:solidFill>
+                        <a:schemeClr val="tx1"/>
+                      </a:solidFill>
+                      <a:prstDash val="solid"/>
+                      <a:round/>
+                      <a:headEnd type="none" w="med" len="med"/>
+                      <a:tailEnd type="none" w="med" len="med"/>
+                    </a:lnL>
+                    <a:lnR w="12700" cap="flat" cmpd="sng" algn="ctr">
+                      <a:solidFill>
+                        <a:schemeClr val="tx1"/>
+                      </a:solidFill>
+                      <a:prstDash val="solid"/>
+                      <a:round/>
+                      <a:headEnd type="none" w="med" len="med"/>
+                      <a:tailEnd type="none" w="med" len="med"/>
+                    </a:lnR>
+                    <a:lnT w="12700" cap="flat" cmpd="sng" algn="ctr">
+                      <a:solidFill>
+                        <a:schemeClr val="tx1"/>
+                      </a:solidFill>
+                      <a:prstDash val="solid"/>
+                      <a:round/>
+                      <a:headEnd type="none" w="med" len="med"/>
+                      <a:tailEnd type="none" w="med" len="med"/>
+                    </a:lnT>
+                    <a:lnB w="12700" cap="flat" cmpd="sng" algn="ctr">
+                      <a:solidFill>
+                        <a:schemeClr val="tx1"/>
+                      </a:solidFill>
+                      <a:prstDash val="solid"/>
+                      <a:round/>
+                      <a:headEnd type="none" w="med" len="med"/>
+                      <a:tailEnd type="none" w="med" len="med"/>
+                    </a:lnB>
+                  </a:tcPr>
+                </a:tc>
+                <a:extLst>
+                  <a:ext uri="{0D108BD9-81ED-4DB2-BD59-A6C34878D82A}">
+                    <a16:rowId xmlns:a16="http://schemas.microsoft.com/office/drawing/2014/main" val="3647233555"/>
+                  </a:ext>
+                </a:extLst>
+              </a:tr>
+            </a:tbl>
+          </a:graphicData>
+        </a:graphic>
+      </p:graphicFrame>
+      <p:graphicFrame>
+        <p:nvGraphicFramePr>
+          <p:cNvPr id="69" name="Table 68">
+            <a:extLst>
+              <a:ext uri="{FF2B5EF4-FFF2-40B4-BE49-F238E27FC236}">
+                <a16:creationId xmlns:a16="http://schemas.microsoft.com/office/drawing/2014/main" id="{DC773E4F-97E7-4298-8167-B92CD0FA0E40}"/>
+              </a:ext>
+            </a:extLst>
+          </p:cNvPr>
+          <p:cNvGraphicFramePr>
+            <a:graphicFrameLocks noGrp="1"/>
+          </p:cNvGraphicFramePr>
+          <p:nvPr>
+            <p:extLst>
+              <p:ext uri="{D42A27DB-BD31-4B8C-83A1-F6EECF244321}">
+                <p14:modId xmlns:p14="http://schemas.microsoft.com/office/powerpoint/2010/main" val="2166633435"/>
+              </p:ext>
+            </p:extLst>
+          </p:nvPr>
+        </p:nvGraphicFramePr>
+        <p:xfrm>
+          <a:off x="10639919" y="821031"/>
+          <a:ext cx="2428874" cy="472440"/>
+        </p:xfrm>
+        <a:graphic>
+          <a:graphicData uri="http://schemas.openxmlformats.org/drawingml/2006/table">
+            <a:tbl>
+              <a:tblPr firstRow="1" bandRow="1">
+                <a:tableStyleId>{93296810-A885-4BE3-A3E7-6D5BEEA58F35}</a:tableStyleId>
+              </a:tblPr>
+              <a:tblGrid>
+                <a:gridCol w="2428874">
+                  <a:extLst>
+                    <a:ext uri="{9D8B030D-6E8A-4147-A177-3AD203B41FA5}">
+                      <a16:colId xmlns:a16="http://schemas.microsoft.com/office/drawing/2014/main" val="1895854942"/>
+                    </a:ext>
+                  </a:extLst>
+                </a:gridCol>
+              </a:tblGrid>
+              <a:tr h="441601">
+                <a:tc>
+                  <a:txBody>
+                    <a:bodyPr/>
+                    <a:lstStyle/>
+                    <a:p>
+                      <a:pPr algn="ctr"/>
+                      <a:r>
+                        <a:rPr lang="it-IT" sz="2500" dirty="0"/>
+                        <a:t>InternalLoad</a:t>
+                      </a:r>
+                      <a:endParaRPr lang="it-IT" sz="2500" dirty="0">
+                        <a:solidFill>
+                          <a:schemeClr val="tx1"/>
+                        </a:solidFill>
+                      </a:endParaRPr>
+                    </a:p>
+                  </a:txBody>
+                  <a:tcPr>
+                    <a:lnL w="12700" cap="flat" cmpd="sng" algn="ctr">
+                      <a:solidFill>
+                        <a:schemeClr val="tx1"/>
+                      </a:solidFill>
+                      <a:prstDash val="solid"/>
+                      <a:round/>
+                      <a:headEnd type="none" w="med" len="med"/>
+                      <a:tailEnd type="none" w="med" len="med"/>
+                    </a:lnL>
+                    <a:lnR w="12700" cap="flat" cmpd="sng" algn="ctr">
+                      <a:solidFill>
+                        <a:schemeClr val="tx1"/>
+                      </a:solidFill>
+                      <a:prstDash val="solid"/>
+                      <a:round/>
+                      <a:headEnd type="none" w="med" len="med"/>
+                      <a:tailEnd type="none" w="med" len="med"/>
+                    </a:lnR>
+                    <a:lnT w="12700" cap="flat" cmpd="sng" algn="ctr">
+                      <a:solidFill>
+                        <a:schemeClr val="tx1"/>
+                      </a:solidFill>
+                      <a:prstDash val="solid"/>
+                      <a:round/>
+                      <a:headEnd type="none" w="med" len="med"/>
+                      <a:tailEnd type="none" w="med" len="med"/>
+                    </a:lnT>
+                    <a:lnB w="12700" cap="flat" cmpd="sng" algn="ctr">
+                      <a:solidFill>
+                        <a:schemeClr val="tx1"/>
+                      </a:solidFill>
+                      <a:prstDash val="solid"/>
+                      <a:round/>
+                      <a:headEnd type="none" w="med" len="med"/>
+                      <a:tailEnd type="none" w="med" len="med"/>
+                    </a:lnB>
+                  </a:tcPr>
+                </a:tc>
+                <a:extLst>
+                  <a:ext uri="{0D108BD9-81ED-4DB2-BD59-A6C34878D82A}">
+                    <a16:rowId xmlns:a16="http://schemas.microsoft.com/office/drawing/2014/main" val="3647233555"/>
+                  </a:ext>
+                </a:extLst>
+              </a:tr>
+            </a:tbl>
+          </a:graphicData>
+        </a:graphic>
+      </p:graphicFrame>
+      <p:graphicFrame>
+        <p:nvGraphicFramePr>
+          <p:cNvPr id="70" name="Table 69">
+            <a:extLst>
+              <a:ext uri="{FF2B5EF4-FFF2-40B4-BE49-F238E27FC236}">
+                <a16:creationId xmlns:a16="http://schemas.microsoft.com/office/drawing/2014/main" id="{E54D2EBA-5B8B-4800-A871-B550BA77F3BB}"/>
+              </a:ext>
+            </a:extLst>
+          </p:cNvPr>
+          <p:cNvGraphicFramePr>
+            <a:graphicFrameLocks noGrp="1"/>
+          </p:cNvGraphicFramePr>
+          <p:nvPr>
+            <p:extLst>
+              <p:ext uri="{D42A27DB-BD31-4B8C-83A1-F6EECF244321}">
+                <p14:modId xmlns:p14="http://schemas.microsoft.com/office/powerpoint/2010/main" val="3681498406"/>
+              </p:ext>
+            </p:extLst>
+          </p:nvPr>
+        </p:nvGraphicFramePr>
+        <p:xfrm>
+          <a:off x="12342349" y="1969295"/>
+          <a:ext cx="1859778" cy="472440"/>
+        </p:xfrm>
+        <a:graphic>
+          <a:graphicData uri="http://schemas.openxmlformats.org/drawingml/2006/table">
+            <a:tbl>
+              <a:tblPr firstRow="1" bandRow="1">
+                <a:tableStyleId>{93296810-A885-4BE3-A3E7-6D5BEEA58F35}</a:tableStyleId>
+              </a:tblPr>
+              <a:tblGrid>
+                <a:gridCol w="1859778">
+                  <a:extLst>
+                    <a:ext uri="{9D8B030D-6E8A-4147-A177-3AD203B41FA5}">
+                      <a16:colId xmlns:a16="http://schemas.microsoft.com/office/drawing/2014/main" val="1895854942"/>
+                    </a:ext>
+                  </a:extLst>
+                </a:gridCol>
+              </a:tblGrid>
+              <a:tr h="361057">
+                <a:tc>
+                  <a:txBody>
+                    <a:bodyPr/>
+                    <a:lstStyle/>
+                    <a:p>
+                      <a:pPr algn="ctr"/>
+                      <a:r>
+                        <a:rPr lang="it-IT" sz="2500" dirty="0"/>
+                        <a:t>People</a:t>
+                      </a:r>
+                      <a:endParaRPr lang="it-IT" sz="2500" dirty="0">
+                        <a:solidFill>
+                          <a:schemeClr val="tx1"/>
+                        </a:solidFill>
+                      </a:endParaRPr>
+                    </a:p>
+                  </a:txBody>
+                  <a:tcPr>
+                    <a:lnL w="12700" cap="flat" cmpd="sng" algn="ctr">
+                      <a:solidFill>
+                        <a:schemeClr val="tx1"/>
+                      </a:solidFill>
+                      <a:prstDash val="solid"/>
+                      <a:round/>
+                      <a:headEnd type="none" w="med" len="med"/>
+                      <a:tailEnd type="none" w="med" len="med"/>
+                    </a:lnL>
+                    <a:lnR w="12700" cap="flat" cmpd="sng" algn="ctr">
+                      <a:solidFill>
+                        <a:schemeClr val="tx1"/>
+                      </a:solidFill>
+                      <a:prstDash val="solid"/>
+                      <a:round/>
+                      <a:headEnd type="none" w="med" len="med"/>
+                      <a:tailEnd type="none" w="med" len="med"/>
+                    </a:lnR>
+                    <a:lnT w="12700" cap="flat" cmpd="sng" algn="ctr">
+                      <a:solidFill>
+                        <a:schemeClr val="tx1"/>
+                      </a:solidFill>
+                      <a:prstDash val="solid"/>
+                      <a:round/>
+                      <a:headEnd type="none" w="med" len="med"/>
+                      <a:tailEnd type="none" w="med" len="med"/>
+                    </a:lnT>
+                    <a:lnB w="12700" cap="flat" cmpd="sng" algn="ctr">
+                      <a:solidFill>
+                        <a:schemeClr val="tx1"/>
+                      </a:solidFill>
+                      <a:prstDash val="solid"/>
+                      <a:round/>
+                      <a:headEnd type="none" w="med" len="med"/>
+                      <a:tailEnd type="none" w="med" len="med"/>
+                    </a:lnB>
+                  </a:tcPr>
+                </a:tc>
+                <a:extLst>
+                  <a:ext uri="{0D108BD9-81ED-4DB2-BD59-A6C34878D82A}">
+                    <a16:rowId xmlns:a16="http://schemas.microsoft.com/office/drawing/2014/main" val="3647233555"/>
+                  </a:ext>
+                </a:extLst>
+              </a:tr>
+            </a:tbl>
+          </a:graphicData>
+        </a:graphic>
+      </p:graphicFrame>
+      <p:graphicFrame>
+        <p:nvGraphicFramePr>
+          <p:cNvPr id="71" name="Table 70">
+            <a:extLst>
+              <a:ext uri="{FF2B5EF4-FFF2-40B4-BE49-F238E27FC236}">
+                <a16:creationId xmlns:a16="http://schemas.microsoft.com/office/drawing/2014/main" id="{29BE7DB3-DB7E-446E-A8E9-E61AA7A911E8}"/>
+              </a:ext>
+            </a:extLst>
+          </p:cNvPr>
+          <p:cNvGraphicFramePr>
+            <a:graphicFrameLocks noGrp="1"/>
+          </p:cNvGraphicFramePr>
+          <p:nvPr>
+            <p:extLst>
+              <p:ext uri="{D42A27DB-BD31-4B8C-83A1-F6EECF244321}">
+                <p14:modId xmlns:p14="http://schemas.microsoft.com/office/powerpoint/2010/main" val="3210339339"/>
+              </p:ext>
+            </p:extLst>
+          </p:nvPr>
+        </p:nvGraphicFramePr>
+        <p:xfrm>
+          <a:off x="14309261" y="1969295"/>
+          <a:ext cx="1859778" cy="472440"/>
+        </p:xfrm>
+        <a:graphic>
+          <a:graphicData uri="http://schemas.openxmlformats.org/drawingml/2006/table">
+            <a:tbl>
+              <a:tblPr firstRow="1" bandRow="1">
+                <a:tableStyleId>{93296810-A885-4BE3-A3E7-6D5BEEA58F35}</a:tableStyleId>
+              </a:tblPr>
+              <a:tblGrid>
+                <a:gridCol w="1859778">
+                  <a:extLst>
+                    <a:ext uri="{9D8B030D-6E8A-4147-A177-3AD203B41FA5}">
+                      <a16:colId xmlns:a16="http://schemas.microsoft.com/office/drawing/2014/main" val="1895854942"/>
+                    </a:ext>
+                  </a:extLst>
+                </a:gridCol>
+              </a:tblGrid>
+              <a:tr h="361057">
+                <a:tc>
+                  <a:txBody>
+                    <a:bodyPr/>
+                    <a:lstStyle/>
+                    <a:p>
+                      <a:pPr algn="ctr"/>
+                      <a:r>
+                        <a:rPr lang="it-IT" sz="2500" dirty="0"/>
+                        <a:t>ElectricLoad</a:t>
+                      </a:r>
+                      <a:endParaRPr lang="it-IT" sz="2500" dirty="0">
+                        <a:solidFill>
+                          <a:schemeClr val="tx1"/>
+                        </a:solidFill>
+                      </a:endParaRPr>
+                    </a:p>
+                  </a:txBody>
+                  <a:tcPr>
+                    <a:lnL w="12700" cap="flat" cmpd="sng" algn="ctr">
+                      <a:solidFill>
+                        <a:schemeClr val="tx1"/>
+                      </a:solidFill>
+                      <a:prstDash val="solid"/>
+                      <a:round/>
+                      <a:headEnd type="none" w="med" len="med"/>
+                      <a:tailEnd type="none" w="med" len="med"/>
+                    </a:lnL>
+                    <a:lnR w="12700" cap="flat" cmpd="sng" algn="ctr">
+                      <a:solidFill>
+                        <a:schemeClr val="tx1"/>
+                      </a:solidFill>
+                      <a:prstDash val="solid"/>
+                      <a:round/>
+                      <a:headEnd type="none" w="med" len="med"/>
+                      <a:tailEnd type="none" w="med" len="med"/>
+                    </a:lnR>
+                    <a:lnT w="12700" cap="flat" cmpd="sng" algn="ctr">
+                      <a:solidFill>
+                        <a:schemeClr val="tx1"/>
+                      </a:solidFill>
+                      <a:prstDash val="solid"/>
+                      <a:round/>
+                      <a:headEnd type="none" w="med" len="med"/>
+                      <a:tailEnd type="none" w="med" len="med"/>
+                    </a:lnT>
+                    <a:lnB w="12700" cap="flat" cmpd="sng" algn="ctr">
+                      <a:solidFill>
+                        <a:schemeClr val="tx1"/>
+                      </a:solidFill>
+                      <a:prstDash val="solid"/>
+                      <a:round/>
+                      <a:headEnd type="none" w="med" len="med"/>
+                      <a:tailEnd type="none" w="med" len="med"/>
+                    </a:lnB>
+                  </a:tcPr>
+                </a:tc>
+                <a:extLst>
+                  <a:ext uri="{0D108BD9-81ED-4DB2-BD59-A6C34878D82A}">
+                    <a16:rowId xmlns:a16="http://schemas.microsoft.com/office/drawing/2014/main" val="3647233555"/>
+                  </a:ext>
+                </a:extLst>
+              </a:tr>
+            </a:tbl>
+          </a:graphicData>
+        </a:graphic>
+      </p:graphicFrame>
+      <p:graphicFrame>
+        <p:nvGraphicFramePr>
+          <p:cNvPr id="72" name="Table 71">
+            <a:extLst>
+              <a:ext uri="{FF2B5EF4-FFF2-40B4-BE49-F238E27FC236}">
+                <a16:creationId xmlns:a16="http://schemas.microsoft.com/office/drawing/2014/main" id="{265F2455-6A71-4B9C-B6AB-7A2E9FBD370D}"/>
+              </a:ext>
+            </a:extLst>
+          </p:cNvPr>
+          <p:cNvGraphicFramePr>
+            <a:graphicFrameLocks noGrp="1"/>
+          </p:cNvGraphicFramePr>
+          <p:nvPr>
+            <p:extLst>
+              <p:ext uri="{D42A27DB-BD31-4B8C-83A1-F6EECF244321}">
+                <p14:modId xmlns:p14="http://schemas.microsoft.com/office/powerpoint/2010/main" val="3537528083"/>
+              </p:ext>
+            </p:extLst>
+          </p:nvPr>
+        </p:nvGraphicFramePr>
+        <p:xfrm>
+          <a:off x="10429004" y="1969295"/>
+          <a:ext cx="1859778" cy="472440"/>
+        </p:xfrm>
+        <a:graphic>
+          <a:graphicData uri="http://schemas.openxmlformats.org/drawingml/2006/table">
+            <a:tbl>
+              <a:tblPr firstRow="1" bandRow="1">
+                <a:tableStyleId>{93296810-A885-4BE3-A3E7-6D5BEEA58F35}</a:tableStyleId>
+              </a:tblPr>
+              <a:tblGrid>
+                <a:gridCol w="1859778">
+                  <a:extLst>
+                    <a:ext uri="{9D8B030D-6E8A-4147-A177-3AD203B41FA5}">
+                      <a16:colId xmlns:a16="http://schemas.microsoft.com/office/drawing/2014/main" val="1895854942"/>
+                    </a:ext>
+                  </a:extLst>
+                </a:gridCol>
+              </a:tblGrid>
+              <a:tr h="361057">
+                <a:tc>
+                  <a:txBody>
+                    <a:bodyPr/>
+                    <a:lstStyle/>
+                    <a:p>
+                      <a:pPr algn="ctr"/>
+                      <a:r>
+                        <a:rPr lang="it-IT" sz="2500" dirty="0"/>
+                        <a:t>Lights</a:t>
+                      </a:r>
+                      <a:endParaRPr lang="it-IT" sz="2500" dirty="0">
+                        <a:solidFill>
+                          <a:schemeClr val="tx1"/>
+                        </a:solidFill>
+                      </a:endParaRPr>
+                    </a:p>
+                  </a:txBody>
+                  <a:tcPr>
+                    <a:lnL w="12700" cap="flat" cmpd="sng" algn="ctr">
+                      <a:solidFill>
+                        <a:schemeClr val="tx1"/>
+                      </a:solidFill>
+                      <a:prstDash val="solid"/>
+                      <a:round/>
+                      <a:headEnd type="none" w="med" len="med"/>
+                      <a:tailEnd type="none" w="med" len="med"/>
+                    </a:lnL>
+                    <a:lnR w="12700" cap="flat" cmpd="sng" algn="ctr">
+                      <a:solidFill>
+                        <a:schemeClr val="tx1"/>
+                      </a:solidFill>
+                      <a:prstDash val="solid"/>
+                      <a:round/>
+                      <a:headEnd type="none" w="med" len="med"/>
+                      <a:tailEnd type="none" w="med" len="med"/>
+                    </a:lnR>
+                    <a:lnT w="12700" cap="flat" cmpd="sng" algn="ctr">
+                      <a:solidFill>
+                        <a:schemeClr val="tx1"/>
+                      </a:solidFill>
+                      <a:prstDash val="solid"/>
+                      <a:round/>
+                      <a:headEnd type="none" w="med" len="med"/>
+                      <a:tailEnd type="none" w="med" len="med"/>
+                    </a:lnT>
+                    <a:lnB w="12700" cap="flat" cmpd="sng" algn="ctr">
+                      <a:solidFill>
+                        <a:schemeClr val="tx1"/>
+                      </a:solidFill>
+                      <a:prstDash val="solid"/>
+                      <a:round/>
+                      <a:headEnd type="none" w="med" len="med"/>
+                      <a:tailEnd type="none" w="med" len="med"/>
+                    </a:lnB>
+                  </a:tcPr>
+                </a:tc>
+                <a:extLst>
+                  <a:ext uri="{0D108BD9-81ED-4DB2-BD59-A6C34878D82A}">
+                    <a16:rowId xmlns:a16="http://schemas.microsoft.com/office/drawing/2014/main" val="3647233555"/>
+                  </a:ext>
+                </a:extLst>
+              </a:tr>
+            </a:tbl>
+          </a:graphicData>
+        </a:graphic>
+      </p:graphicFrame>
+      <p:graphicFrame>
+        <p:nvGraphicFramePr>
+          <p:cNvPr id="73" name="Table 72">
+            <a:extLst>
+              <a:ext uri="{FF2B5EF4-FFF2-40B4-BE49-F238E27FC236}">
+                <a16:creationId xmlns:a16="http://schemas.microsoft.com/office/drawing/2014/main" id="{56BF6745-7E3B-46E9-9B8D-FBCA926E84C8}"/>
+              </a:ext>
+            </a:extLst>
+          </p:cNvPr>
+          <p:cNvGraphicFramePr>
+            <a:graphicFrameLocks noGrp="1"/>
+          </p:cNvGraphicFramePr>
+          <p:nvPr>
+            <p:extLst>
+              <p:ext uri="{D42A27DB-BD31-4B8C-83A1-F6EECF244321}">
+                <p14:modId xmlns:p14="http://schemas.microsoft.com/office/powerpoint/2010/main" val="3790299221"/>
+              </p:ext>
+            </p:extLst>
+          </p:nvPr>
+        </p:nvGraphicFramePr>
+        <p:xfrm>
+          <a:off x="18827386" y="1936714"/>
+          <a:ext cx="2653757" cy="472440"/>
+        </p:xfrm>
+        <a:graphic>
+          <a:graphicData uri="http://schemas.openxmlformats.org/drawingml/2006/table">
+            <a:tbl>
+              <a:tblPr firstRow="1" bandRow="1">
+                <a:tableStyleId>{93296810-A885-4BE3-A3E7-6D5BEEA58F35}</a:tableStyleId>
+              </a:tblPr>
+              <a:tblGrid>
+                <a:gridCol w="2653757">
+                  <a:extLst>
+                    <a:ext uri="{9D8B030D-6E8A-4147-A177-3AD203B41FA5}">
+                      <a16:colId xmlns:a16="http://schemas.microsoft.com/office/drawing/2014/main" val="1895854942"/>
+                    </a:ext>
+                  </a:extLst>
+                </a:gridCol>
+              </a:tblGrid>
+              <a:tr h="361057">
+                <a:tc>
+                  <a:txBody>
+                    <a:bodyPr/>
+                    <a:lstStyle/>
+                    <a:p>
+                      <a:pPr algn="ctr"/>
+                      <a:r>
+                        <a:rPr lang="it-IT" sz="2500" dirty="0"/>
+                        <a:t>SetpointDualBand</a:t>
+                      </a:r>
+                      <a:endParaRPr lang="it-IT" sz="2500" dirty="0">
+                        <a:solidFill>
+                          <a:schemeClr val="tx1"/>
+                        </a:solidFill>
+                      </a:endParaRPr>
+                    </a:p>
+                  </a:txBody>
+                  <a:tcPr>
+                    <a:lnL w="12700" cap="flat" cmpd="sng" algn="ctr">
+                      <a:solidFill>
+                        <a:schemeClr val="tx1"/>
+                      </a:solidFill>
+                      <a:prstDash val="solid"/>
+                      <a:round/>
+                      <a:headEnd type="none" w="med" len="med"/>
+                      <a:tailEnd type="none" w="med" len="med"/>
+                    </a:lnL>
+                    <a:lnR w="12700" cap="flat" cmpd="sng" algn="ctr">
+                      <a:solidFill>
+                        <a:schemeClr val="tx1"/>
+                      </a:solidFill>
+                      <a:prstDash val="solid"/>
+                      <a:round/>
+                      <a:headEnd type="none" w="med" len="med"/>
+                      <a:tailEnd type="none" w="med" len="med"/>
+                    </a:lnR>
+                    <a:lnT w="12700" cap="flat" cmpd="sng" algn="ctr">
+                      <a:solidFill>
+                        <a:schemeClr val="tx1"/>
+                      </a:solidFill>
+                      <a:prstDash val="solid"/>
+                      <a:round/>
+                      <a:headEnd type="none" w="med" len="med"/>
+                      <a:tailEnd type="none" w="med" len="med"/>
+                    </a:lnT>
+                    <a:lnB w="12700" cap="flat" cmpd="sng" algn="ctr">
+                      <a:solidFill>
+                        <a:schemeClr val="tx1"/>
+                      </a:solidFill>
+                      <a:prstDash val="solid"/>
+                      <a:round/>
+                      <a:headEnd type="none" w="med" len="med"/>
+                      <a:tailEnd type="none" w="med" len="med"/>
+                    </a:lnB>
+                  </a:tcPr>
+                </a:tc>
+                <a:extLst>
+                  <a:ext uri="{0D108BD9-81ED-4DB2-BD59-A6C34878D82A}">
+                    <a16:rowId xmlns:a16="http://schemas.microsoft.com/office/drawing/2014/main" val="3647233555"/>
+                  </a:ext>
+                </a:extLst>
+              </a:tr>
+            </a:tbl>
+          </a:graphicData>
+        </a:graphic>
+      </p:graphicFrame>
+      <p:graphicFrame>
+        <p:nvGraphicFramePr>
+          <p:cNvPr id="74" name="Table 73">
+            <a:extLst>
+              <a:ext uri="{FF2B5EF4-FFF2-40B4-BE49-F238E27FC236}">
+                <a16:creationId xmlns:a16="http://schemas.microsoft.com/office/drawing/2014/main" id="{5743CA98-DCFC-4524-BAB9-A2517378FF95}"/>
+              </a:ext>
+            </a:extLst>
+          </p:cNvPr>
+          <p:cNvGraphicFramePr>
+            <a:graphicFrameLocks noGrp="1"/>
+          </p:cNvGraphicFramePr>
+          <p:nvPr>
+            <p:extLst>
+              <p:ext uri="{D42A27DB-BD31-4B8C-83A1-F6EECF244321}">
+                <p14:modId xmlns:p14="http://schemas.microsoft.com/office/powerpoint/2010/main" val="303021022"/>
+              </p:ext>
+            </p:extLst>
+          </p:nvPr>
+        </p:nvGraphicFramePr>
+        <p:xfrm>
+          <a:off x="19160818" y="792003"/>
+          <a:ext cx="1859778" cy="472440"/>
+        </p:xfrm>
+        <a:graphic>
+          <a:graphicData uri="http://schemas.openxmlformats.org/drawingml/2006/table">
+            <a:tbl>
+              <a:tblPr firstRow="1" bandRow="1">
+                <a:tableStyleId>{93296810-A885-4BE3-A3E7-6D5BEEA58F35}</a:tableStyleId>
+              </a:tblPr>
+              <a:tblGrid>
+                <a:gridCol w="1859778">
+                  <a:extLst>
+                    <a:ext uri="{9D8B030D-6E8A-4147-A177-3AD203B41FA5}">
+                      <a16:colId xmlns:a16="http://schemas.microsoft.com/office/drawing/2014/main" val="1895854942"/>
+                    </a:ext>
+                  </a:extLst>
+                </a:gridCol>
+              </a:tblGrid>
+              <a:tr h="361057">
+                <a:tc>
+                  <a:txBody>
+                    <a:bodyPr/>
+                    <a:lstStyle/>
+                    <a:p>
+                      <a:pPr algn="ctr"/>
+                      <a:r>
+                        <a:rPr lang="it-IT" sz="2500" dirty="0"/>
+                        <a:t>Setpoint</a:t>
+                      </a:r>
+                      <a:endParaRPr lang="it-IT" sz="2500" dirty="0">
+                        <a:solidFill>
+                          <a:schemeClr val="tx1"/>
+                        </a:solidFill>
+                      </a:endParaRPr>
+                    </a:p>
+                  </a:txBody>
+                  <a:tcPr>
+                    <a:lnL w="12700" cap="flat" cmpd="sng" algn="ctr">
+                      <a:solidFill>
+                        <a:schemeClr val="tx1"/>
+                      </a:solidFill>
+                      <a:prstDash val="solid"/>
+                      <a:round/>
+                      <a:headEnd type="none" w="med" len="med"/>
+                      <a:tailEnd type="none" w="med" len="med"/>
+                    </a:lnL>
+                    <a:lnR w="12700" cap="flat" cmpd="sng" algn="ctr">
+                      <a:solidFill>
+                        <a:schemeClr val="tx1"/>
+                      </a:solidFill>
+                      <a:prstDash val="solid"/>
+                      <a:round/>
+                      <a:headEnd type="none" w="med" len="med"/>
+                      <a:tailEnd type="none" w="med" len="med"/>
+                    </a:lnR>
+                    <a:lnT w="12700" cap="flat" cmpd="sng" algn="ctr">
+                      <a:solidFill>
+                        <a:schemeClr val="tx1"/>
+                      </a:solidFill>
+                      <a:prstDash val="solid"/>
+                      <a:round/>
+                      <a:headEnd type="none" w="med" len="med"/>
+                      <a:tailEnd type="none" w="med" len="med"/>
+                    </a:lnT>
+                    <a:lnB w="12700" cap="flat" cmpd="sng" algn="ctr">
+                      <a:solidFill>
+                        <a:schemeClr val="tx1"/>
+                      </a:solidFill>
+                      <a:prstDash val="solid"/>
+                      <a:round/>
+                      <a:headEnd type="none" w="med" len="med"/>
+                      <a:tailEnd type="none" w="med" len="med"/>
+                    </a:lnB>
+                  </a:tcPr>
+                </a:tc>
+                <a:extLst>
+                  <a:ext uri="{0D108BD9-81ED-4DB2-BD59-A6C34878D82A}">
+                    <a16:rowId xmlns:a16="http://schemas.microsoft.com/office/drawing/2014/main" val="3647233555"/>
+                  </a:ext>
+                </a:extLst>
+              </a:tr>
+            </a:tbl>
+          </a:graphicData>
+        </a:graphic>
+      </p:graphicFrame>
+      <p:cxnSp>
+        <p:nvCxnSpPr>
+          <p:cNvPr id="78" name="Connector: Elbow 77">
+            <a:extLst>
+              <a:ext uri="{FF2B5EF4-FFF2-40B4-BE49-F238E27FC236}">
+                <a16:creationId xmlns:a16="http://schemas.microsoft.com/office/drawing/2014/main" id="{2862CBA2-C9B5-40EB-B00B-790718316365}"/>
+              </a:ext>
+            </a:extLst>
+          </p:cNvPr>
+          <p:cNvCxnSpPr>
+            <a:cxnSpLocks/>
+            <a:stCxn id="69" idx="2"/>
+            <a:endCxn id="72" idx="0"/>
+          </p:cNvCxnSpPr>
+          <p:nvPr/>
+        </p:nvCxnSpPr>
+        <p:spPr>
+          <a:xfrm rot="5400000">
+            <a:off x="11268713" y="1383652"/>
+            <a:ext cx="675824" cy="495463"/>
+          </a:xfrm>
+          <a:prstGeom prst="bentConnector3">
+            <a:avLst>
+              <a:gd name="adj1" fmla="val 50000"/>
+            </a:avLst>
+          </a:prstGeom>
+          <a:ln cap="sq">
+            <a:solidFill>
+              <a:srgbClr val="FF0000"/>
+            </a:solidFill>
+            <a:bevel/>
+            <a:headEnd type="diamond" w="lg" len="lg"/>
+            <a:tailEnd type="none"/>
+          </a:ln>
+        </p:spPr>
+        <p:style>
+          <a:lnRef idx="1">
+            <a:schemeClr val="accent1"/>
+          </a:lnRef>
+          <a:fillRef idx="0">
+            <a:schemeClr val="accent1"/>
+          </a:fillRef>
+          <a:effectRef idx="0">
+            <a:schemeClr val="accent1"/>
+          </a:effectRef>
+          <a:fontRef idx="minor">
+            <a:schemeClr val="tx1"/>
+          </a:fontRef>
+        </p:style>
+      </p:cxnSp>
+      <p:cxnSp>
+        <p:nvCxnSpPr>
+          <p:cNvPr id="86" name="Connector: Elbow 85">
+            <a:extLst>
+              <a:ext uri="{FF2B5EF4-FFF2-40B4-BE49-F238E27FC236}">
+                <a16:creationId xmlns:a16="http://schemas.microsoft.com/office/drawing/2014/main" id="{B6C8B39B-BA98-462A-8D04-1C022C694E8A}"/>
+              </a:ext>
+            </a:extLst>
+          </p:cNvPr>
+          <p:cNvCxnSpPr>
+            <a:cxnSpLocks/>
+            <a:stCxn id="69" idx="2"/>
+            <a:endCxn id="70" idx="0"/>
+          </p:cNvCxnSpPr>
+          <p:nvPr/>
+        </p:nvCxnSpPr>
+        <p:spPr>
+          <a:xfrm rot="16200000" flipH="1">
+            <a:off x="12225385" y="922442"/>
+            <a:ext cx="675824" cy="1417882"/>
+          </a:xfrm>
+          <a:prstGeom prst="bentConnector3">
+            <a:avLst>
+              <a:gd name="adj1" fmla="val 50000"/>
+            </a:avLst>
+          </a:prstGeom>
+          <a:ln cap="sq">
+            <a:solidFill>
+              <a:srgbClr val="FF0000"/>
+            </a:solidFill>
+            <a:bevel/>
+            <a:headEnd type="diamond" w="lg" len="lg"/>
+            <a:tailEnd type="none"/>
+          </a:ln>
+        </p:spPr>
+        <p:style>
+          <a:lnRef idx="1">
+            <a:schemeClr val="accent1"/>
+          </a:lnRef>
+          <a:fillRef idx="0">
+            <a:schemeClr val="accent1"/>
+          </a:fillRef>
+          <a:effectRef idx="0">
+            <a:schemeClr val="accent1"/>
+          </a:effectRef>
+          <a:fontRef idx="minor">
+            <a:schemeClr val="tx1"/>
+          </a:fontRef>
+        </p:style>
+      </p:cxnSp>
+      <p:cxnSp>
+        <p:nvCxnSpPr>
+          <p:cNvPr id="89" name="Connector: Elbow 88">
+            <a:extLst>
+              <a:ext uri="{FF2B5EF4-FFF2-40B4-BE49-F238E27FC236}">
+                <a16:creationId xmlns:a16="http://schemas.microsoft.com/office/drawing/2014/main" id="{3551505D-0B5C-4752-AF3B-B152ECB91988}"/>
+              </a:ext>
+            </a:extLst>
+          </p:cNvPr>
+          <p:cNvCxnSpPr>
+            <a:cxnSpLocks/>
+            <a:stCxn id="69" idx="2"/>
+            <a:endCxn id="71" idx="0"/>
+          </p:cNvCxnSpPr>
+          <p:nvPr/>
+        </p:nvCxnSpPr>
+        <p:spPr>
+          <a:xfrm rot="16200000" flipH="1">
+            <a:off x="13208841" y="-61014"/>
+            <a:ext cx="675824" cy="3384794"/>
+          </a:xfrm>
+          <a:prstGeom prst="bentConnector3">
+            <a:avLst>
+              <a:gd name="adj1" fmla="val 50000"/>
+            </a:avLst>
+          </a:prstGeom>
+          <a:ln cap="sq">
+            <a:solidFill>
+              <a:srgbClr val="FF0000"/>
+            </a:solidFill>
+            <a:bevel/>
+            <a:headEnd type="diamond" w="lg" len="lg"/>
+            <a:tailEnd type="none"/>
+          </a:ln>
+        </p:spPr>
+        <p:style>
+          <a:lnRef idx="1">
+            <a:schemeClr val="accent1"/>
+          </a:lnRef>
+          <a:fillRef idx="0">
+            <a:schemeClr val="accent1"/>
+          </a:fillRef>
+          <a:effectRef idx="0">
+            <a:schemeClr val="accent1"/>
+          </a:effectRef>
+          <a:fontRef idx="minor">
+            <a:schemeClr val="tx1"/>
+          </a:fontRef>
+        </p:style>
+      </p:cxnSp>
+      <p:cxnSp>
+        <p:nvCxnSpPr>
+          <p:cNvPr id="92" name="Connector: Elbow 91">
+            <a:extLst>
+              <a:ext uri="{FF2B5EF4-FFF2-40B4-BE49-F238E27FC236}">
+                <a16:creationId xmlns:a16="http://schemas.microsoft.com/office/drawing/2014/main" id="{0E04DCF8-AB93-4AE3-A872-4D7E921BA3B8}"/>
+              </a:ext>
+            </a:extLst>
+          </p:cNvPr>
+          <p:cNvCxnSpPr>
+            <a:cxnSpLocks/>
+            <a:stCxn id="74" idx="2"/>
+            <a:endCxn id="73" idx="0"/>
+          </p:cNvCxnSpPr>
+          <p:nvPr/>
+        </p:nvCxnSpPr>
+        <p:spPr>
+          <a:xfrm rot="16200000" flipH="1">
+            <a:off x="19786350" y="1568799"/>
+            <a:ext cx="672271" cy="63557"/>
+          </a:xfrm>
+          <a:prstGeom prst="bentConnector3">
+            <a:avLst>
+              <a:gd name="adj1" fmla="val 50000"/>
+            </a:avLst>
+          </a:prstGeom>
+          <a:ln cap="sq">
+            <a:solidFill>
+              <a:srgbClr val="FF0000"/>
+            </a:solidFill>
+            <a:bevel/>
+            <a:headEnd type="diamond" w="lg" len="lg"/>
+            <a:tailEnd type="none"/>
+          </a:ln>
+        </p:spPr>
+        <p:style>
+          <a:lnRef idx="1">
+            <a:schemeClr val="accent1"/>
+          </a:lnRef>
+          <a:fillRef idx="0">
+            <a:schemeClr val="accent1"/>
+          </a:fillRef>
+          <a:effectRef idx="0">
+            <a:schemeClr val="accent1"/>
+          </a:effectRef>
+          <a:fontRef idx="minor">
+            <a:schemeClr val="tx1"/>
+          </a:fontRef>
+        </p:style>
+      </p:cxnSp>
+      <p:cxnSp>
+        <p:nvCxnSpPr>
+          <p:cNvPr id="95" name="Connector: Elbow 94">
+            <a:extLst>
+              <a:ext uri="{FF2B5EF4-FFF2-40B4-BE49-F238E27FC236}">
+                <a16:creationId xmlns:a16="http://schemas.microsoft.com/office/drawing/2014/main" id="{0CE83F40-EA3A-4EA3-9FC3-A7DB5AC3B0B1}"/>
+              </a:ext>
+            </a:extLst>
+          </p:cNvPr>
+          <p:cNvCxnSpPr>
+            <a:cxnSpLocks/>
+            <a:stCxn id="72" idx="0"/>
+            <a:endCxn id="68" idx="2"/>
+          </p:cNvCxnSpPr>
+          <p:nvPr/>
+        </p:nvCxnSpPr>
+        <p:spPr>
+          <a:xfrm rot="5400000" flipH="1" flipV="1">
+            <a:off x="13041673" y="-406787"/>
+            <a:ext cx="693302" cy="4058863"/>
+          </a:xfrm>
+          <a:prstGeom prst="bentConnector3">
+            <a:avLst>
+              <a:gd name="adj1" fmla="val 50000"/>
+            </a:avLst>
+          </a:prstGeom>
+          <a:ln>
+            <a:solidFill>
+              <a:schemeClr val="tx1"/>
+            </a:solidFill>
+            <a:tailEnd type="triangle"/>
+          </a:ln>
+        </p:spPr>
+        <p:style>
+          <a:lnRef idx="1">
+            <a:schemeClr val="accent1"/>
+          </a:lnRef>
+          <a:fillRef idx="0">
+            <a:schemeClr val="accent1"/>
+          </a:fillRef>
+          <a:effectRef idx="0">
+            <a:schemeClr val="accent1"/>
+          </a:effectRef>
+          <a:fontRef idx="minor">
+            <a:schemeClr val="tx1"/>
+          </a:fontRef>
+        </p:style>
+      </p:cxnSp>
+      <p:cxnSp>
+        <p:nvCxnSpPr>
+          <p:cNvPr id="107" name="Connector: Elbow 106">
+            <a:extLst>
+              <a:ext uri="{FF2B5EF4-FFF2-40B4-BE49-F238E27FC236}">
+                <a16:creationId xmlns:a16="http://schemas.microsoft.com/office/drawing/2014/main" id="{2A029959-F4A4-4973-AED2-53F799B654CE}"/>
+              </a:ext>
+            </a:extLst>
+          </p:cNvPr>
+          <p:cNvCxnSpPr>
+            <a:cxnSpLocks/>
+            <a:stCxn id="70" idx="0"/>
+            <a:endCxn id="68" idx="2"/>
+          </p:cNvCxnSpPr>
+          <p:nvPr/>
+        </p:nvCxnSpPr>
+        <p:spPr>
+          <a:xfrm rot="5400000" flipH="1" flipV="1">
+            <a:off x="13998346" y="549885"/>
+            <a:ext cx="693302" cy="2145518"/>
+          </a:xfrm>
+          <a:prstGeom prst="bentConnector3">
+            <a:avLst>
+              <a:gd name="adj1" fmla="val 50000"/>
+            </a:avLst>
+          </a:prstGeom>
+          <a:ln>
+            <a:solidFill>
+              <a:schemeClr val="tx1"/>
+            </a:solidFill>
+            <a:tailEnd type="triangle"/>
+          </a:ln>
+        </p:spPr>
+        <p:style>
+          <a:lnRef idx="1">
+            <a:schemeClr val="accent1"/>
+          </a:lnRef>
+          <a:fillRef idx="0">
+            <a:schemeClr val="accent1"/>
+          </a:fillRef>
+          <a:effectRef idx="0">
+            <a:schemeClr val="accent1"/>
+          </a:effectRef>
+          <a:fontRef idx="minor">
+            <a:schemeClr val="tx1"/>
+          </a:fontRef>
+        </p:style>
+      </p:cxnSp>
+      <p:cxnSp>
+        <p:nvCxnSpPr>
+          <p:cNvPr id="110" name="Connector: Elbow 109">
+            <a:extLst>
+              <a:ext uri="{FF2B5EF4-FFF2-40B4-BE49-F238E27FC236}">
+                <a16:creationId xmlns:a16="http://schemas.microsoft.com/office/drawing/2014/main" id="{6C3576BA-70DC-46C8-992A-BD596A090611}"/>
+              </a:ext>
+            </a:extLst>
+          </p:cNvPr>
+          <p:cNvCxnSpPr>
+            <a:cxnSpLocks/>
+            <a:stCxn id="71" idx="0"/>
+            <a:endCxn id="68" idx="2"/>
+          </p:cNvCxnSpPr>
+          <p:nvPr/>
+        </p:nvCxnSpPr>
+        <p:spPr>
+          <a:xfrm rot="5400000" flipH="1" flipV="1">
+            <a:off x="14981802" y="1533341"/>
+            <a:ext cx="693302" cy="178606"/>
+          </a:xfrm>
+          <a:prstGeom prst="bentConnector3">
+            <a:avLst>
+              <a:gd name="adj1" fmla="val 50000"/>
+            </a:avLst>
+          </a:prstGeom>
+          <a:ln>
+            <a:solidFill>
+              <a:schemeClr val="tx1"/>
+            </a:solidFill>
+            <a:tailEnd type="triangle"/>
+          </a:ln>
+        </p:spPr>
+        <p:style>
+          <a:lnRef idx="1">
+            <a:schemeClr val="accent1"/>
+          </a:lnRef>
+          <a:fillRef idx="0">
+            <a:schemeClr val="accent1"/>
+          </a:fillRef>
+          <a:effectRef idx="0">
+            <a:schemeClr val="accent1"/>
+          </a:effectRef>
+          <a:fontRef idx="minor">
+            <a:schemeClr val="tx1"/>
+          </a:fontRef>
+        </p:style>
+      </p:cxnSp>
+      <p:cxnSp>
+        <p:nvCxnSpPr>
+          <p:cNvPr id="113" name="Connector: Elbow 112">
+            <a:extLst>
+              <a:ext uri="{FF2B5EF4-FFF2-40B4-BE49-F238E27FC236}">
+                <a16:creationId xmlns:a16="http://schemas.microsoft.com/office/drawing/2014/main" id="{FF3C4732-2923-40C3-83C1-48E2F1122615}"/>
+              </a:ext>
+            </a:extLst>
+          </p:cNvPr>
+          <p:cNvCxnSpPr>
+            <a:cxnSpLocks/>
+            <a:stCxn id="73" idx="0"/>
+            <a:endCxn id="68" idx="2"/>
+          </p:cNvCxnSpPr>
+          <p:nvPr/>
+        </p:nvCxnSpPr>
+        <p:spPr>
+          <a:xfrm rot="16200000" flipV="1">
+            <a:off x="17455650" y="-761900"/>
+            <a:ext cx="660721" cy="4736508"/>
+          </a:xfrm>
+          <a:prstGeom prst="bentConnector3">
+            <a:avLst>
+              <a:gd name="adj1" fmla="val 50000"/>
+            </a:avLst>
+          </a:prstGeom>
+          <a:ln>
+            <a:solidFill>
+              <a:schemeClr val="tx1"/>
+            </a:solidFill>
+            <a:tailEnd type="triangle"/>
+          </a:ln>
+        </p:spPr>
+        <p:style>
+          <a:lnRef idx="1">
+            <a:schemeClr val="accent1"/>
+          </a:lnRef>
+          <a:fillRef idx="0">
+            <a:schemeClr val="accent1"/>
+          </a:fillRef>
+          <a:effectRef idx="0">
+            <a:schemeClr val="accent1"/>
+          </a:effectRef>
+          <a:fontRef idx="minor">
+            <a:schemeClr val="tx1"/>
+          </a:fontRef>
+        </p:style>
+      </p:cxnSp>
+      <p:graphicFrame>
+        <p:nvGraphicFramePr>
+          <p:cNvPr id="118" name="Table 117">
+            <a:extLst>
+              <a:ext uri="{FF2B5EF4-FFF2-40B4-BE49-F238E27FC236}">
+                <a16:creationId xmlns:a16="http://schemas.microsoft.com/office/drawing/2014/main" id="{053843CA-EE9E-43EA-9E10-2E0EA170FDC9}"/>
+              </a:ext>
+            </a:extLst>
+          </p:cNvPr>
+          <p:cNvGraphicFramePr>
+            <a:graphicFrameLocks noGrp="1"/>
+          </p:cNvGraphicFramePr>
+          <p:nvPr>
+            <p:extLst>
+              <p:ext uri="{D42A27DB-BD31-4B8C-83A1-F6EECF244321}">
+                <p14:modId xmlns:p14="http://schemas.microsoft.com/office/powerpoint/2010/main" val="3177465401"/>
+              </p:ext>
+            </p:extLst>
+          </p:nvPr>
+        </p:nvGraphicFramePr>
+        <p:xfrm>
+          <a:off x="16813748" y="1936714"/>
+          <a:ext cx="1859778" cy="472440"/>
+        </p:xfrm>
+        <a:graphic>
+          <a:graphicData uri="http://schemas.openxmlformats.org/drawingml/2006/table">
+            <a:tbl>
+              <a:tblPr firstRow="1" bandRow="1">
+                <a:tableStyleId>{93296810-A885-4BE3-A3E7-6D5BEEA58F35}</a:tableStyleId>
+              </a:tblPr>
+              <a:tblGrid>
+                <a:gridCol w="1859778">
+                  <a:extLst>
+                    <a:ext uri="{9D8B030D-6E8A-4147-A177-3AD203B41FA5}">
+                      <a16:colId xmlns:a16="http://schemas.microsoft.com/office/drawing/2014/main" val="1895854942"/>
+                    </a:ext>
+                  </a:extLst>
+                </a:gridCol>
+              </a:tblGrid>
+              <a:tr h="361057">
+                <a:tc>
+                  <a:txBody>
+                    <a:bodyPr/>
+                    <a:lstStyle/>
+                    <a:p>
+                      <a:pPr algn="ctr"/>
+                      <a:r>
+                        <a:rPr lang="it-IT" sz="2500" dirty="0" err="1">
+                          <a:solidFill>
+                            <a:schemeClr val="bg1"/>
+                          </a:solidFill>
+                        </a:rPr>
+                        <a:t>Ventilation</a:t>
+                      </a:r>
+                      <a:endParaRPr lang="it-IT" sz="2500" dirty="0">
+                        <a:solidFill>
+                          <a:schemeClr val="bg1"/>
+                        </a:solidFill>
+                      </a:endParaRPr>
+                    </a:p>
+                  </a:txBody>
+                  <a:tcPr>
+                    <a:lnL w="12700" cap="flat" cmpd="sng" algn="ctr">
+                      <a:solidFill>
+                        <a:schemeClr val="tx1"/>
+                      </a:solidFill>
+                      <a:prstDash val="solid"/>
+                      <a:round/>
+                      <a:headEnd type="none" w="med" len="med"/>
+                      <a:tailEnd type="none" w="med" len="med"/>
+                    </a:lnL>
+                    <a:lnR w="12700" cap="flat" cmpd="sng" algn="ctr">
+                      <a:solidFill>
+                        <a:schemeClr val="tx1"/>
+                      </a:solidFill>
+                      <a:prstDash val="solid"/>
+                      <a:round/>
+                      <a:headEnd type="none" w="med" len="med"/>
+                      <a:tailEnd type="none" w="med" len="med"/>
+                    </a:lnR>
+                    <a:lnT w="12700" cap="flat" cmpd="sng" algn="ctr">
+                      <a:solidFill>
+                        <a:schemeClr val="tx1"/>
+                      </a:solidFill>
+                      <a:prstDash val="solid"/>
+                      <a:round/>
+                      <a:headEnd type="none" w="med" len="med"/>
+                      <a:tailEnd type="none" w="med" len="med"/>
+                    </a:lnT>
+                    <a:lnB w="12700" cap="flat" cmpd="sng" algn="ctr">
+                      <a:solidFill>
+                        <a:schemeClr val="tx1"/>
+                      </a:solidFill>
+                      <a:prstDash val="solid"/>
+                      <a:round/>
+                      <a:headEnd type="none" w="med" len="med"/>
+                      <a:tailEnd type="none" w="med" len="med"/>
+                    </a:lnB>
+                  </a:tcPr>
+                </a:tc>
+                <a:extLst>
+                  <a:ext uri="{0D108BD9-81ED-4DB2-BD59-A6C34878D82A}">
+                    <a16:rowId xmlns:a16="http://schemas.microsoft.com/office/drawing/2014/main" val="3647233555"/>
+                  </a:ext>
+                </a:extLst>
+              </a:tr>
+            </a:tbl>
+          </a:graphicData>
+        </a:graphic>
+      </p:graphicFrame>
+      <p:cxnSp>
+        <p:nvCxnSpPr>
+          <p:cNvPr id="119" name="Connector: Elbow 118">
+            <a:extLst>
+              <a:ext uri="{FF2B5EF4-FFF2-40B4-BE49-F238E27FC236}">
+                <a16:creationId xmlns:a16="http://schemas.microsoft.com/office/drawing/2014/main" id="{829AE4E7-C101-469F-9F03-D58160EC64A9}"/>
+              </a:ext>
+            </a:extLst>
+          </p:cNvPr>
+          <p:cNvCxnSpPr>
+            <a:cxnSpLocks/>
+            <a:stCxn id="118" idx="0"/>
+            <a:endCxn id="68" idx="2"/>
+          </p:cNvCxnSpPr>
+          <p:nvPr/>
+        </p:nvCxnSpPr>
+        <p:spPr>
+          <a:xfrm rot="16200000" flipV="1">
+            <a:off x="16250337" y="443413"/>
+            <a:ext cx="660721" cy="2325881"/>
+          </a:xfrm>
+          <a:prstGeom prst="bentConnector3">
+            <a:avLst>
+              <a:gd name="adj1" fmla="val 50000"/>
+            </a:avLst>
+          </a:prstGeom>
+          <a:ln>
+            <a:solidFill>
+              <a:schemeClr val="tx1"/>
+            </a:solidFill>
+            <a:tailEnd type="triangle"/>
+          </a:ln>
+        </p:spPr>
+        <p:style>
+          <a:lnRef idx="1">
+            <a:schemeClr val="accent1"/>
+          </a:lnRef>
+          <a:fillRef idx="0">
+            <a:schemeClr val="accent1"/>
+          </a:fillRef>
+          <a:effectRef idx="0">
+            <a:schemeClr val="accent1"/>
+          </a:effectRef>
+          <a:fontRef idx="minor">
+            <a:schemeClr val="tx1"/>
+          </a:fontRef>
+        </p:style>
+      </p:cxnSp>
+      <p:cxnSp>
+        <p:nvCxnSpPr>
+          <p:cNvPr id="122" name="Connector: Elbow 121">
+            <a:extLst>
+              <a:ext uri="{FF2B5EF4-FFF2-40B4-BE49-F238E27FC236}">
+                <a16:creationId xmlns:a16="http://schemas.microsoft.com/office/drawing/2014/main" id="{ED222A10-CC31-4D98-849B-C183ED00F10D}"/>
+              </a:ext>
+            </a:extLst>
+          </p:cNvPr>
+          <p:cNvCxnSpPr>
+            <a:cxnSpLocks/>
+            <a:stCxn id="67" idx="0"/>
+            <a:endCxn id="37" idx="2"/>
+          </p:cNvCxnSpPr>
+          <p:nvPr/>
+        </p:nvCxnSpPr>
+        <p:spPr>
+          <a:xfrm rot="16200000" flipV="1">
+            <a:off x="5167280" y="4083004"/>
+            <a:ext cx="3206789" cy="1383744"/>
+          </a:xfrm>
+          <a:prstGeom prst="bentConnector3">
+            <a:avLst>
+              <a:gd name="adj1" fmla="val 62220"/>
+            </a:avLst>
+          </a:prstGeom>
+          <a:ln>
+            <a:solidFill>
+              <a:schemeClr val="tx1"/>
+            </a:solidFill>
+            <a:tailEnd type="triangle"/>
+          </a:ln>
+        </p:spPr>
+        <p:style>
+          <a:lnRef idx="1">
+            <a:schemeClr val="accent1"/>
+          </a:lnRef>
+          <a:fillRef idx="0">
+            <a:schemeClr val="accent1"/>
+          </a:fillRef>
+          <a:effectRef idx="0">
+            <a:schemeClr val="accent1"/>
+          </a:effectRef>
+          <a:fontRef idx="minor">
+            <a:schemeClr val="tx1"/>
+          </a:fontRef>
+        </p:style>
+      </p:cxnSp>
+      <p:cxnSp>
+        <p:nvCxnSpPr>
+          <p:cNvPr id="125" name="Connector: Elbow 124">
+            <a:extLst>
+              <a:ext uri="{FF2B5EF4-FFF2-40B4-BE49-F238E27FC236}">
+                <a16:creationId xmlns:a16="http://schemas.microsoft.com/office/drawing/2014/main" id="{07B0A93A-0946-4A87-8841-65B01EF6FAF1}"/>
+              </a:ext>
+            </a:extLst>
+          </p:cNvPr>
+          <p:cNvCxnSpPr>
+            <a:cxnSpLocks/>
+            <a:stCxn id="67" idx="0"/>
+            <a:endCxn id="38" idx="2"/>
+          </p:cNvCxnSpPr>
+          <p:nvPr/>
+        </p:nvCxnSpPr>
+        <p:spPr>
+          <a:xfrm rot="5400000" flipH="1" flipV="1">
+            <a:off x="6627553" y="4387471"/>
+            <a:ext cx="2825792" cy="1155807"/>
+          </a:xfrm>
+          <a:prstGeom prst="bentConnector3">
+            <a:avLst>
+              <a:gd name="adj1" fmla="val 70545"/>
+            </a:avLst>
+          </a:prstGeom>
+          <a:ln>
+            <a:solidFill>
+              <a:schemeClr val="tx1"/>
+            </a:solidFill>
+            <a:tailEnd type="triangle"/>
+          </a:ln>
+        </p:spPr>
+        <p:style>
+          <a:lnRef idx="1">
+            <a:schemeClr val="accent1"/>
+          </a:lnRef>
+          <a:fillRef idx="0">
+            <a:schemeClr val="accent1"/>
+          </a:fillRef>
+          <a:effectRef idx="0">
+            <a:schemeClr val="accent1"/>
+          </a:effectRef>
+          <a:fontRef idx="minor">
+            <a:schemeClr val="tx1"/>
+          </a:fontRef>
+        </p:style>
+      </p:cxnSp>
+      <p:cxnSp>
+        <p:nvCxnSpPr>
+          <p:cNvPr id="128" name="Connector: Elbow 127">
+            <a:extLst>
+              <a:ext uri="{FF2B5EF4-FFF2-40B4-BE49-F238E27FC236}">
+                <a16:creationId xmlns:a16="http://schemas.microsoft.com/office/drawing/2014/main" id="{4239F599-F2D2-4C13-8DC6-331E59F7911D}"/>
+              </a:ext>
+            </a:extLst>
+          </p:cNvPr>
+          <p:cNvCxnSpPr>
+            <a:cxnSpLocks/>
+            <a:stCxn id="67" idx="0"/>
+            <a:endCxn id="72" idx="2"/>
+          </p:cNvCxnSpPr>
+          <p:nvPr/>
+        </p:nvCxnSpPr>
+        <p:spPr>
+          <a:xfrm rot="5400000" flipH="1" flipV="1">
+            <a:off x="7442452" y="2461830"/>
+            <a:ext cx="3936535" cy="3896347"/>
+          </a:xfrm>
+          <a:prstGeom prst="bentConnector3">
+            <a:avLst>
+              <a:gd name="adj1" fmla="val 50000"/>
+            </a:avLst>
+          </a:prstGeom>
+          <a:ln>
+            <a:solidFill>
+              <a:schemeClr val="tx1"/>
+            </a:solidFill>
+            <a:tailEnd type="triangle"/>
+          </a:ln>
+        </p:spPr>
+        <p:style>
+          <a:lnRef idx="1">
+            <a:schemeClr val="accent1"/>
+          </a:lnRef>
+          <a:fillRef idx="0">
+            <a:schemeClr val="accent1"/>
+          </a:fillRef>
+          <a:effectRef idx="0">
+            <a:schemeClr val="accent1"/>
+          </a:effectRef>
+          <a:fontRef idx="minor">
+            <a:schemeClr val="tx1"/>
+          </a:fontRef>
+        </p:style>
+      </p:cxnSp>
+      <p:cxnSp>
+        <p:nvCxnSpPr>
+          <p:cNvPr id="131" name="Connector: Elbow 130">
+            <a:extLst>
+              <a:ext uri="{FF2B5EF4-FFF2-40B4-BE49-F238E27FC236}">
+                <a16:creationId xmlns:a16="http://schemas.microsoft.com/office/drawing/2014/main" id="{9B761068-FFDA-441C-875F-34C51C0249EE}"/>
+              </a:ext>
+            </a:extLst>
+          </p:cNvPr>
+          <p:cNvCxnSpPr>
+            <a:cxnSpLocks/>
+            <a:stCxn id="67" idx="0"/>
+            <a:endCxn id="70" idx="2"/>
+          </p:cNvCxnSpPr>
+          <p:nvPr/>
+        </p:nvCxnSpPr>
+        <p:spPr>
+          <a:xfrm rot="5400000" flipH="1" flipV="1">
+            <a:off x="8399125" y="1505157"/>
+            <a:ext cx="3936535" cy="5809692"/>
+          </a:xfrm>
+          <a:prstGeom prst="bentConnector3">
+            <a:avLst>
+              <a:gd name="adj1" fmla="val 50000"/>
+            </a:avLst>
+          </a:prstGeom>
+          <a:ln>
+            <a:solidFill>
+              <a:schemeClr val="tx1"/>
+            </a:solidFill>
+            <a:tailEnd type="triangle"/>
+          </a:ln>
+        </p:spPr>
+        <p:style>
+          <a:lnRef idx="1">
+            <a:schemeClr val="accent1"/>
+          </a:lnRef>
+          <a:fillRef idx="0">
+            <a:schemeClr val="accent1"/>
+          </a:fillRef>
+          <a:effectRef idx="0">
+            <a:schemeClr val="accent1"/>
+          </a:effectRef>
+          <a:fontRef idx="minor">
+            <a:schemeClr val="tx1"/>
+          </a:fontRef>
+        </p:style>
+      </p:cxnSp>
+      <p:cxnSp>
+        <p:nvCxnSpPr>
+          <p:cNvPr id="134" name="Connector: Elbow 133">
+            <a:extLst>
+              <a:ext uri="{FF2B5EF4-FFF2-40B4-BE49-F238E27FC236}">
+                <a16:creationId xmlns:a16="http://schemas.microsoft.com/office/drawing/2014/main" id="{30B9606F-4A3C-45C5-85A1-746EF2B99158}"/>
+              </a:ext>
+            </a:extLst>
+          </p:cNvPr>
+          <p:cNvCxnSpPr>
+            <a:cxnSpLocks/>
+            <a:stCxn id="67" idx="0"/>
+            <a:endCxn id="71" idx="2"/>
+          </p:cNvCxnSpPr>
+          <p:nvPr/>
+        </p:nvCxnSpPr>
+        <p:spPr>
+          <a:xfrm rot="5400000" flipH="1" flipV="1">
+            <a:off x="9382581" y="521701"/>
+            <a:ext cx="3936535" cy="7776604"/>
+          </a:xfrm>
+          <a:prstGeom prst="bentConnector3">
+            <a:avLst>
+              <a:gd name="adj1" fmla="val 50000"/>
+            </a:avLst>
+          </a:prstGeom>
+          <a:ln>
+            <a:solidFill>
+              <a:schemeClr val="tx1"/>
+            </a:solidFill>
+            <a:tailEnd type="triangle"/>
+          </a:ln>
+        </p:spPr>
+        <p:style>
+          <a:lnRef idx="1">
+            <a:schemeClr val="accent1"/>
+          </a:lnRef>
+          <a:fillRef idx="0">
+            <a:schemeClr val="accent1"/>
+          </a:fillRef>
+          <a:effectRef idx="0">
+            <a:schemeClr val="accent1"/>
+          </a:effectRef>
+          <a:fontRef idx="minor">
+            <a:schemeClr val="tx1"/>
+          </a:fontRef>
+        </p:style>
+      </p:cxnSp>
+      <p:cxnSp>
+        <p:nvCxnSpPr>
+          <p:cNvPr id="140" name="Connector: Elbow 139">
+            <a:extLst>
+              <a:ext uri="{FF2B5EF4-FFF2-40B4-BE49-F238E27FC236}">
+                <a16:creationId xmlns:a16="http://schemas.microsoft.com/office/drawing/2014/main" id="{8B6B6F3F-D43C-438C-8E14-89FB8C3F3288}"/>
+              </a:ext>
+            </a:extLst>
+          </p:cNvPr>
+          <p:cNvCxnSpPr>
+            <a:cxnSpLocks/>
+            <a:stCxn id="67" idx="0"/>
+            <a:endCxn id="73" idx="2"/>
+          </p:cNvCxnSpPr>
+          <p:nvPr/>
+        </p:nvCxnSpPr>
+        <p:spPr>
+          <a:xfrm rot="5400000" flipH="1" flipV="1">
+            <a:off x="11823847" y="-1952147"/>
+            <a:ext cx="3969116" cy="12691718"/>
+          </a:xfrm>
+          <a:prstGeom prst="bentConnector3">
+            <a:avLst>
+              <a:gd name="adj1" fmla="val 50000"/>
+            </a:avLst>
+          </a:prstGeom>
+          <a:ln>
+            <a:solidFill>
+              <a:schemeClr val="tx1"/>
+            </a:solidFill>
+            <a:tailEnd type="triangle"/>
+          </a:ln>
+        </p:spPr>
+        <p:style>
+          <a:lnRef idx="1">
+            <a:schemeClr val="accent1"/>
+          </a:lnRef>
+          <a:fillRef idx="0">
+            <a:schemeClr val="accent1"/>
+          </a:fillRef>
+          <a:effectRef idx="0">
+            <a:schemeClr val="accent1"/>
+          </a:effectRef>
+          <a:fontRef idx="minor">
+            <a:schemeClr val="tx1"/>
+          </a:fontRef>
+        </p:style>
+      </p:cxnSp>
+      <p:graphicFrame>
+        <p:nvGraphicFramePr>
+          <p:cNvPr id="44" name="Table 43">
+            <a:extLst>
+              <a:ext uri="{FF2B5EF4-FFF2-40B4-BE49-F238E27FC236}">
+                <a16:creationId xmlns:a16="http://schemas.microsoft.com/office/drawing/2014/main" id="{5906BC36-E070-4161-B127-ECFA464894B9}"/>
+              </a:ext>
+            </a:extLst>
+          </p:cNvPr>
+          <p:cNvGraphicFramePr>
+            <a:graphicFrameLocks noGrp="1"/>
+          </p:cNvGraphicFramePr>
+          <p:nvPr>
+            <p:extLst>
+              <p:ext uri="{D42A27DB-BD31-4B8C-83A1-F6EECF244321}">
+                <p14:modId xmlns:p14="http://schemas.microsoft.com/office/powerpoint/2010/main" val="3432743132"/>
+              </p:ext>
+            </p:extLst>
+          </p:nvPr>
+        </p:nvGraphicFramePr>
+        <p:xfrm>
+          <a:off x="17214798" y="4576900"/>
+          <a:ext cx="1859778" cy="853440"/>
+        </p:xfrm>
+        <a:graphic>
+          <a:graphicData uri="http://schemas.openxmlformats.org/drawingml/2006/table">
+            <a:tbl>
+              <a:tblPr firstRow="1" bandRow="1">
+                <a:tableStyleId>{073A0DAA-6AF3-43AB-8588-CEC1D06C72B9}</a:tableStyleId>
+              </a:tblPr>
+              <a:tblGrid>
+                <a:gridCol w="1859778">
+                  <a:extLst>
+                    <a:ext uri="{9D8B030D-6E8A-4147-A177-3AD203B41FA5}">
+                      <a16:colId xmlns:a16="http://schemas.microsoft.com/office/drawing/2014/main" val="1895854942"/>
+                    </a:ext>
+                  </a:extLst>
+                </a:gridCol>
+              </a:tblGrid>
+              <a:tr h="361057">
+                <a:tc>
+                  <a:txBody>
+                    <a:bodyPr/>
+                    <a:lstStyle/>
+                    <a:p>
+                      <a:pPr algn="ctr"/>
+                      <a:r>
+                        <a:rPr lang="it-IT" sz="2500" dirty="0"/>
+                        <a:t>MechanicalVentilation</a:t>
+                      </a:r>
+                      <a:endParaRPr lang="it-IT" sz="2500" dirty="0">
+                        <a:solidFill>
+                          <a:schemeClr val="bg1"/>
+                        </a:solidFill>
+                      </a:endParaRPr>
+                    </a:p>
+                  </a:txBody>
+                  <a:tcPr/>
+                </a:tc>
+                <a:extLst>
+                  <a:ext uri="{0D108BD9-81ED-4DB2-BD59-A6C34878D82A}">
+                    <a16:rowId xmlns:a16="http://schemas.microsoft.com/office/drawing/2014/main" val="3647233555"/>
+                  </a:ext>
+                </a:extLst>
+              </a:tr>
+            </a:tbl>
+          </a:graphicData>
+        </a:graphic>
+      </p:graphicFrame>
+      <p:cxnSp>
+        <p:nvCxnSpPr>
+          <p:cNvPr id="45" name="Connector: Elbow 44">
+            <a:extLst>
+              <a:ext uri="{FF2B5EF4-FFF2-40B4-BE49-F238E27FC236}">
+                <a16:creationId xmlns:a16="http://schemas.microsoft.com/office/drawing/2014/main" id="{41DDA6CB-5961-4178-B81D-708DB5F1397E}"/>
+              </a:ext>
+            </a:extLst>
+          </p:cNvPr>
+          <p:cNvCxnSpPr>
+            <a:cxnSpLocks/>
+            <a:stCxn id="118" idx="2"/>
+            <a:endCxn id="43" idx="0"/>
+          </p:cNvCxnSpPr>
+          <p:nvPr/>
+        </p:nvCxnSpPr>
+        <p:spPr>
+          <a:xfrm rot="5400000">
+            <a:off x="17137984" y="2507865"/>
+            <a:ext cx="704365" cy="506943"/>
+          </a:xfrm>
+          <a:prstGeom prst="bentConnector3">
+            <a:avLst>
+              <a:gd name="adj1" fmla="val 50000"/>
+            </a:avLst>
+          </a:prstGeom>
+          <a:ln cap="sq">
+            <a:solidFill>
+              <a:srgbClr val="FF0000"/>
+            </a:solidFill>
+            <a:bevel/>
+            <a:headEnd type="diamond" w="lg" len="lg"/>
+            <a:tailEnd type="none"/>
+          </a:ln>
+        </p:spPr>
+        <p:style>
+          <a:lnRef idx="1">
+            <a:schemeClr val="accent1"/>
+          </a:lnRef>
+          <a:fillRef idx="0">
+            <a:schemeClr val="accent1"/>
+          </a:fillRef>
+          <a:effectRef idx="0">
+            <a:schemeClr val="accent1"/>
+          </a:effectRef>
+          <a:fontRef idx="minor">
+            <a:schemeClr val="tx1"/>
+          </a:fontRef>
+        </p:style>
+      </p:cxnSp>
+      <p:cxnSp>
+        <p:nvCxnSpPr>
+          <p:cNvPr id="48" name="Connector: Elbow 47">
+            <a:extLst>
+              <a:ext uri="{FF2B5EF4-FFF2-40B4-BE49-F238E27FC236}">
+                <a16:creationId xmlns:a16="http://schemas.microsoft.com/office/drawing/2014/main" id="{25ED90A1-BC19-454B-9B57-DBD9FDAE68EA}"/>
+              </a:ext>
+            </a:extLst>
+          </p:cNvPr>
+          <p:cNvCxnSpPr>
+            <a:cxnSpLocks/>
+            <a:stCxn id="118" idx="2"/>
+            <a:endCxn id="44" idx="0"/>
+          </p:cNvCxnSpPr>
+          <p:nvPr/>
+        </p:nvCxnSpPr>
+        <p:spPr>
+          <a:xfrm rot="16200000" flipH="1">
+            <a:off x="16860289" y="3292502"/>
+            <a:ext cx="2167746" cy="401050"/>
+          </a:xfrm>
+          <a:prstGeom prst="bentConnector3">
+            <a:avLst>
+              <a:gd name="adj1" fmla="val 50000"/>
+            </a:avLst>
+          </a:prstGeom>
+          <a:ln cap="sq">
+            <a:solidFill>
+              <a:srgbClr val="FF0000"/>
+            </a:solidFill>
+            <a:bevel/>
+            <a:headEnd type="diamond" w="lg" len="lg"/>
+            <a:tailEnd type="none"/>
+          </a:ln>
+        </p:spPr>
+        <p:style>
+          <a:lnRef idx="1">
+            <a:schemeClr val="accent1"/>
+          </a:lnRef>
+          <a:fillRef idx="0">
+            <a:schemeClr val="accent1"/>
+          </a:fillRef>
+          <a:effectRef idx="0">
+            <a:schemeClr val="accent1"/>
+          </a:effectRef>
+          <a:fontRef idx="minor">
+            <a:schemeClr val="tx1"/>
+          </a:fontRef>
+        </p:style>
+      </p:cxnSp>
+      <p:cxnSp>
+        <p:nvCxnSpPr>
+          <p:cNvPr id="52" name="Connector: Elbow 51">
+            <a:extLst>
+              <a:ext uri="{FF2B5EF4-FFF2-40B4-BE49-F238E27FC236}">
+                <a16:creationId xmlns:a16="http://schemas.microsoft.com/office/drawing/2014/main" id="{97F4D1B0-3534-43F2-BB11-ADFAC09BB5F8}"/>
+              </a:ext>
+            </a:extLst>
+          </p:cNvPr>
+          <p:cNvCxnSpPr>
+            <a:cxnSpLocks/>
+            <a:stCxn id="67" idx="0"/>
+            <a:endCxn id="43" idx="2"/>
+          </p:cNvCxnSpPr>
+          <p:nvPr/>
+        </p:nvCxnSpPr>
+        <p:spPr>
+          <a:xfrm rot="5400000" flipH="1" flipV="1">
+            <a:off x="10953465" y="95041"/>
+            <a:ext cx="2792311" cy="9774148"/>
+          </a:xfrm>
+          <a:prstGeom prst="bentConnector3">
+            <a:avLst>
+              <a:gd name="adj1" fmla="val 70792"/>
+            </a:avLst>
+          </a:prstGeom>
+          <a:ln>
+            <a:solidFill>
+              <a:schemeClr val="tx1"/>
+            </a:solidFill>
+            <a:tailEnd type="triangle"/>
+          </a:ln>
+        </p:spPr>
+        <p:style>
+          <a:lnRef idx="1">
+            <a:schemeClr val="accent1"/>
+          </a:lnRef>
+          <a:fillRef idx="0">
+            <a:schemeClr val="accent1"/>
+          </a:fillRef>
+          <a:effectRef idx="0">
+            <a:schemeClr val="accent1"/>
+          </a:effectRef>
+          <a:fontRef idx="minor">
+            <a:schemeClr val="tx1"/>
+          </a:fontRef>
+        </p:style>
+      </p:cxnSp>
+      <p:cxnSp>
+        <p:nvCxnSpPr>
+          <p:cNvPr id="79" name="Connector: Elbow 78">
+            <a:extLst>
+              <a:ext uri="{FF2B5EF4-FFF2-40B4-BE49-F238E27FC236}">
+                <a16:creationId xmlns:a16="http://schemas.microsoft.com/office/drawing/2014/main" id="{AA77544D-386B-4852-900F-5D292A753034}"/>
+              </a:ext>
+            </a:extLst>
+          </p:cNvPr>
+          <p:cNvCxnSpPr>
+            <a:cxnSpLocks/>
+            <a:stCxn id="76" idx="3"/>
+            <a:endCxn id="44" idx="2"/>
+          </p:cNvCxnSpPr>
+          <p:nvPr/>
+        </p:nvCxnSpPr>
+        <p:spPr>
+          <a:xfrm>
+            <a:off x="14255695" y="4975133"/>
+            <a:ext cx="3888992" cy="455207"/>
+          </a:xfrm>
+          <a:prstGeom prst="bentConnector4">
+            <a:avLst>
+              <a:gd name="adj1" fmla="val 38045"/>
+              <a:gd name="adj2" fmla="val 150219"/>
+            </a:avLst>
+          </a:prstGeom>
+          <a:ln>
+            <a:solidFill>
+              <a:schemeClr val="tx1"/>
+            </a:solidFill>
+            <a:tailEnd type="triangle"/>
+          </a:ln>
+        </p:spPr>
+        <p:style>
+          <a:lnRef idx="1">
+            <a:schemeClr val="accent1"/>
+          </a:lnRef>
+          <a:fillRef idx="0">
+            <a:schemeClr val="accent1"/>
+          </a:fillRef>
+          <a:effectRef idx="0">
+            <a:schemeClr val="accent1"/>
+          </a:effectRef>
+          <a:fontRef idx="minor">
+            <a:schemeClr val="tx1"/>
+          </a:fontRef>
+        </p:style>
+      </p:cxnSp>
+      <p:cxnSp>
+        <p:nvCxnSpPr>
+          <p:cNvPr id="80" name="Connector: Elbow 79">
+            <a:extLst>
+              <a:ext uri="{FF2B5EF4-FFF2-40B4-BE49-F238E27FC236}">
+                <a16:creationId xmlns:a16="http://schemas.microsoft.com/office/drawing/2014/main" id="{93CDFC9C-396B-4B19-B146-48D62671DEF5}"/>
+              </a:ext>
+            </a:extLst>
+          </p:cNvPr>
+          <p:cNvCxnSpPr>
+            <a:cxnSpLocks/>
+            <a:stCxn id="76" idx="0"/>
+            <a:endCxn id="4" idx="2"/>
+          </p:cNvCxnSpPr>
+          <p:nvPr/>
+        </p:nvCxnSpPr>
+        <p:spPr>
+          <a:xfrm rot="16200000" flipV="1">
+            <a:off x="5307836" y="-2665336"/>
+            <a:ext cx="3370300" cy="11438198"/>
+          </a:xfrm>
+          <a:prstGeom prst="bentConnector3">
+            <a:avLst>
+              <a:gd name="adj1" fmla="val -7707"/>
+            </a:avLst>
+          </a:prstGeom>
+          <a:ln>
+            <a:solidFill>
+              <a:schemeClr val="tx1"/>
+            </a:solidFill>
+            <a:tailEnd type="triangle"/>
+          </a:ln>
+        </p:spPr>
+        <p:style>
+          <a:lnRef idx="1">
+            <a:schemeClr val="accent1"/>
+          </a:lnRef>
+          <a:fillRef idx="0">
+            <a:schemeClr val="accent1"/>
+          </a:fillRef>
+          <a:effectRef idx="0">
+            <a:schemeClr val="accent1"/>
+          </a:effectRef>
+          <a:fontRef idx="minor">
+            <a:schemeClr val="tx1"/>
+          </a:fontRef>
+        </p:style>
+      </p:cxnSp>
+      <p:cxnSp>
+        <p:nvCxnSpPr>
+          <p:cNvPr id="93" name="Connector: Elbow 92">
+            <a:extLst>
+              <a:ext uri="{FF2B5EF4-FFF2-40B4-BE49-F238E27FC236}">
+                <a16:creationId xmlns:a16="http://schemas.microsoft.com/office/drawing/2014/main" id="{59C7C1A0-4E79-4E7A-B329-E19C1F385782}"/>
+              </a:ext>
+            </a:extLst>
+          </p:cNvPr>
+          <p:cNvCxnSpPr>
+            <a:cxnSpLocks/>
+            <a:stCxn id="67" idx="0"/>
+            <a:endCxn id="76" idx="2"/>
+          </p:cNvCxnSpPr>
+          <p:nvPr/>
+        </p:nvCxnSpPr>
+        <p:spPr>
+          <a:xfrm rot="5400000" flipH="1" flipV="1">
+            <a:off x="9503857" y="3170043"/>
+            <a:ext cx="1166917" cy="5249539"/>
+          </a:xfrm>
+          <a:prstGeom prst="bentConnector3">
+            <a:avLst>
+              <a:gd name="adj1" fmla="val 50000"/>
+            </a:avLst>
+          </a:prstGeom>
+          <a:ln>
+            <a:solidFill>
+              <a:schemeClr val="tx1"/>
+            </a:solidFill>
+            <a:tailEnd type="triangle"/>
+          </a:ln>
+        </p:spPr>
+        <p:style>
+          <a:lnRef idx="1">
+            <a:schemeClr val="accent1"/>
+          </a:lnRef>
+          <a:fillRef idx="0">
+            <a:schemeClr val="accent1"/>
+          </a:fillRef>
+          <a:effectRef idx="0">
+            <a:schemeClr val="accent1"/>
+          </a:effectRef>
+          <a:fontRef idx="minor">
+            <a:schemeClr val="tx1"/>
+          </a:fontRef>
+        </p:style>
+      </p:cxnSp>
+      <p:graphicFrame>
+        <p:nvGraphicFramePr>
+          <p:cNvPr id="43" name="Table 42">
+            <a:extLst>
+              <a:ext uri="{FF2B5EF4-FFF2-40B4-BE49-F238E27FC236}">
+                <a16:creationId xmlns:a16="http://schemas.microsoft.com/office/drawing/2014/main" id="{FA38D13C-73C3-45E9-8886-B2E357BF9E59}"/>
+              </a:ext>
+            </a:extLst>
+          </p:cNvPr>
+          <p:cNvGraphicFramePr>
+            <a:graphicFrameLocks noGrp="1"/>
+          </p:cNvGraphicFramePr>
+          <p:nvPr>
+            <p:extLst>
+              <p:ext uri="{D42A27DB-BD31-4B8C-83A1-F6EECF244321}">
+                <p14:modId xmlns:p14="http://schemas.microsoft.com/office/powerpoint/2010/main" val="1212406037"/>
+              </p:ext>
+            </p:extLst>
+          </p:nvPr>
+        </p:nvGraphicFramePr>
+        <p:xfrm>
+          <a:off x="15883858" y="3113519"/>
+          <a:ext cx="2705672" cy="472440"/>
+        </p:xfrm>
+        <a:graphic>
+          <a:graphicData uri="http://schemas.openxmlformats.org/drawingml/2006/table">
+            <a:tbl>
+              <a:tblPr firstRow="1" bandRow="1">
+                <a:tableStyleId>{93296810-A885-4BE3-A3E7-6D5BEEA58F35}</a:tableStyleId>
+              </a:tblPr>
+              <a:tblGrid>
+                <a:gridCol w="2705672">
+                  <a:extLst>
+                    <a:ext uri="{9D8B030D-6E8A-4147-A177-3AD203B41FA5}">
+                      <a16:colId xmlns:a16="http://schemas.microsoft.com/office/drawing/2014/main" val="1895854942"/>
+                    </a:ext>
+                  </a:extLst>
+                </a:gridCol>
+              </a:tblGrid>
+              <a:tr h="361057">
+                <a:tc>
+                  <a:txBody>
+                    <a:bodyPr/>
+                    <a:lstStyle/>
+                    <a:p>
+                      <a:pPr algn="ctr"/>
+                      <a:r>
+                        <a:rPr lang="it-IT" sz="2500" dirty="0">
+                          <a:solidFill>
+                            <a:schemeClr val="bg1"/>
+                          </a:solidFill>
+                        </a:rPr>
+                        <a:t>NaturalVentilation</a:t>
+                      </a:r>
+                    </a:p>
+                  </a:txBody>
+                  <a:tcPr>
+                    <a:lnL w="12700" cap="flat" cmpd="sng" algn="ctr">
+                      <a:solidFill>
+                        <a:schemeClr val="tx1"/>
+                      </a:solidFill>
+                      <a:prstDash val="solid"/>
+                      <a:round/>
+                      <a:headEnd type="none" w="med" len="med"/>
+                      <a:tailEnd type="none" w="med" len="med"/>
+                    </a:lnL>
+                    <a:lnR w="12700" cap="flat" cmpd="sng" algn="ctr">
+                      <a:solidFill>
+                        <a:schemeClr val="tx1"/>
+                      </a:solidFill>
+                      <a:prstDash val="solid"/>
+                      <a:round/>
+                      <a:headEnd type="none" w="med" len="med"/>
+                      <a:tailEnd type="none" w="med" len="med"/>
+                    </a:lnR>
+                    <a:lnT w="12700" cap="flat" cmpd="sng" algn="ctr">
+                      <a:solidFill>
+                        <a:schemeClr val="tx1"/>
+                      </a:solidFill>
+                      <a:prstDash val="solid"/>
+                      <a:round/>
+                      <a:headEnd type="none" w="med" len="med"/>
+                      <a:tailEnd type="none" w="med" len="med"/>
+                    </a:lnT>
+                    <a:lnB w="12700" cap="flat" cmpd="sng" algn="ctr">
+                      <a:solidFill>
+                        <a:schemeClr val="tx1"/>
+                      </a:solidFill>
+                      <a:prstDash val="solid"/>
+                      <a:round/>
+                      <a:headEnd type="none" w="med" len="med"/>
+                      <a:tailEnd type="none" w="med" len="med"/>
+                    </a:lnB>
+                  </a:tcPr>
+                </a:tc>
+                <a:extLst>
+                  <a:ext uri="{0D108BD9-81ED-4DB2-BD59-A6C34878D82A}">
+                    <a16:rowId xmlns:a16="http://schemas.microsoft.com/office/drawing/2014/main" val="3647233555"/>
+                  </a:ext>
+                </a:extLst>
+              </a:tr>
+            </a:tbl>
+          </a:graphicData>
+        </a:graphic>
+      </p:graphicFrame>
+      <p:graphicFrame>
+        <p:nvGraphicFramePr>
+          <p:cNvPr id="76" name="Table 75">
+            <a:extLst>
+              <a:ext uri="{FF2B5EF4-FFF2-40B4-BE49-F238E27FC236}">
+                <a16:creationId xmlns:a16="http://schemas.microsoft.com/office/drawing/2014/main" id="{8D78ED92-AD0D-4BD7-A169-E57E2600F87C}"/>
+              </a:ext>
+            </a:extLst>
+          </p:cNvPr>
+          <p:cNvGraphicFramePr>
+            <a:graphicFrameLocks noGrp="1"/>
+          </p:cNvGraphicFramePr>
+          <p:nvPr>
+            <p:extLst>
+              <p:ext uri="{D42A27DB-BD31-4B8C-83A1-F6EECF244321}">
+                <p14:modId xmlns:p14="http://schemas.microsoft.com/office/powerpoint/2010/main" val="2825174957"/>
+              </p:ext>
+            </p:extLst>
+          </p:nvPr>
+        </p:nvGraphicFramePr>
+        <p:xfrm>
+          <a:off x="11168475" y="4738913"/>
+          <a:ext cx="3087220" cy="472440"/>
+        </p:xfrm>
+        <a:graphic>
+          <a:graphicData uri="http://schemas.openxmlformats.org/drawingml/2006/table">
+            <a:tbl>
+              <a:tblPr firstRow="1" bandRow="1">
+                <a:tableStyleId>{073A0DAA-6AF3-43AB-8588-CEC1D06C72B9}</a:tableStyleId>
+              </a:tblPr>
+              <a:tblGrid>
+                <a:gridCol w="3087220">
+                  <a:extLst>
+                    <a:ext uri="{9D8B030D-6E8A-4147-A177-3AD203B41FA5}">
+                      <a16:colId xmlns:a16="http://schemas.microsoft.com/office/drawing/2014/main" val="1895854942"/>
+                    </a:ext>
+                  </a:extLst>
+                </a:gridCol>
+              </a:tblGrid>
+              <a:tr h="343625">
+                <a:tc>
+                  <a:txBody>
+                    <a:bodyPr/>
+                    <a:lstStyle/>
+                    <a:p>
+                      <a:pPr algn="ctr"/>
+                      <a:r>
+                        <a:rPr lang="it-IT" sz="2500" dirty="0"/>
+                        <a:t>AirHandlingUnit</a:t>
+                      </a:r>
+                      <a:endParaRPr lang="it-IT" sz="2500" dirty="0">
+                        <a:solidFill>
+                          <a:schemeClr val="bg1"/>
+                        </a:solidFill>
+                      </a:endParaRPr>
+                    </a:p>
+                  </a:txBody>
+                  <a:tcPr/>
+                </a:tc>
+                <a:extLst>
+                  <a:ext uri="{0D108BD9-81ED-4DB2-BD59-A6C34878D82A}">
+                    <a16:rowId xmlns:a16="http://schemas.microsoft.com/office/drawing/2014/main" val="3647233555"/>
+                  </a:ext>
+                </a:extLst>
+              </a:tr>
+            </a:tbl>
+          </a:graphicData>
+        </a:graphic>
+      </p:graphicFrame>
+    </p:spTree>
+    <p:extLst>
+      <p:ext uri="{BB962C8B-B14F-4D97-AF65-F5344CB8AC3E}">
+        <p14:creationId xmlns:p14="http://schemas.microsoft.com/office/powerpoint/2010/main" val="2294034823"/>
+      </p:ext>
+    </p:extLst>
+  </p:cSld>
+  <p:clrMapOvr>
+    <a:masterClrMapping/>
+  </p:clrMapOvr>
+</p:sld>
+</file>
+
+<file path=ppt/slides/slide2.xml><?xml version="1.0" encoding="utf-8"?>
+<p:sld xmlns:a="http://schemas.openxmlformats.org/drawingml/2006/main" xmlns:r="http://schemas.openxmlformats.org/officeDocument/2006/relationships" xmlns:p="http://schemas.openxmlformats.org/presentationml/2006/main">
+  <p:cSld>
+    <p:spTree>
+      <p:nvGrpSpPr>
+        <p:cNvPr id="1" name=""/>
+        <p:cNvGrpSpPr/>
+        <p:nvPr/>
+      </p:nvGrpSpPr>
+      <p:grpSpPr>
+        <a:xfrm>
+          <a:off x="0" y="0"/>
+          <a:ext cx="0" cy="0"/>
+          <a:chOff x="0" y="0"/>
+          <a:chExt cx="0" cy="0"/>
+        </a:xfrm>
+      </p:grpSpPr>
+      <p:cxnSp>
+        <p:nvCxnSpPr>
+          <p:cNvPr id="77" name="Connector: Elbow 76">
+            <a:extLst>
+              <a:ext uri="{FF2B5EF4-FFF2-40B4-BE49-F238E27FC236}">
+                <a16:creationId xmlns:a16="http://schemas.microsoft.com/office/drawing/2014/main" id="{5DAEBAA9-A187-4122-8FC1-C333F5EF147B}"/>
+              </a:ext>
+            </a:extLst>
+          </p:cNvPr>
+          <p:cNvCxnSpPr>
+            <a:cxnSpLocks/>
+            <a:stCxn id="76" idx="0"/>
+            <a:endCxn id="68" idx="2"/>
+          </p:cNvCxnSpPr>
+          <p:nvPr/>
+        </p:nvCxnSpPr>
+        <p:spPr>
+          <a:xfrm rot="5400000" flipH="1" flipV="1">
             <a:off x="10995811" y="4018115"/>
             <a:ext cx="6138219" cy="2705671"/>
           </a:xfrm>
@@ -3079,13 +6607,7 @@
           <p:cNvGraphicFramePr>
             <a:graphicFrameLocks noGrp="1"/>
           </p:cNvGraphicFramePr>
-          <p:nvPr>
-            <p:extLst>
-              <p:ext uri="{D42A27DB-BD31-4B8C-83A1-F6EECF244321}">
-                <p14:modId xmlns:p14="http://schemas.microsoft.com/office/powerpoint/2010/main" val="2014330297"/>
-              </p:ext>
-            </p:extLst>
-          </p:nvPr>
+          <p:nvPr/>
         </p:nvGraphicFramePr>
         <p:xfrm>
           <a:off x="366857" y="866732"/>
@@ -3114,7 +6636,7 @@
                     <a:p>
                       <a:pPr algn="ctr"/>
                       <a:r>
-                        <a:rPr lang="it-IT" sz="1200" dirty="0" err="1"/>
+                        <a:rPr lang="it-IT" sz="1200" dirty="0"/>
                         <a:t>WeatherFile</a:t>
                       </a:r>
                       <a:endParaRPr lang="it-IT" sz="900" dirty="0">
@@ -3278,13 +6800,7 @@
           <p:cNvGraphicFramePr>
             <a:graphicFrameLocks noGrp="1"/>
           </p:cNvGraphicFramePr>
-          <p:nvPr>
-            <p:extLst>
-              <p:ext uri="{D42A27DB-BD31-4B8C-83A1-F6EECF244321}">
-                <p14:modId xmlns:p14="http://schemas.microsoft.com/office/powerpoint/2010/main" val="3420889674"/>
-              </p:ext>
-            </p:extLst>
-          </p:nvPr>
+          <p:nvPr/>
         </p:nvGraphicFramePr>
         <p:xfrm>
           <a:off x="2661954" y="3679400"/>
@@ -3313,7 +6829,7 @@
                     <a:p>
                       <a:pPr algn="ctr"/>
                       <a:r>
-                        <a:rPr lang="it-IT" sz="1200" dirty="0" err="1">
+                        <a:rPr lang="it-IT" sz="1200" dirty="0">
                           <a:solidFill>
                             <a:schemeClr val="tx1"/>
                           </a:solidFill>
@@ -3485,13 +7001,7 @@
           <p:cNvGraphicFramePr>
             <a:graphicFrameLocks noGrp="1"/>
           </p:cNvGraphicFramePr>
-          <p:nvPr>
-            <p:extLst>
-              <p:ext uri="{D42A27DB-BD31-4B8C-83A1-F6EECF244321}">
-                <p14:modId xmlns:p14="http://schemas.microsoft.com/office/powerpoint/2010/main" val="2487339204"/>
-              </p:ext>
-            </p:extLst>
-          </p:nvPr>
+          <p:nvPr/>
         </p:nvGraphicFramePr>
         <p:xfrm>
           <a:off x="2465725" y="866730"/>
@@ -3520,7 +7030,7 @@
                     <a:p>
                       <a:pPr algn="ctr"/>
                       <a:r>
-                        <a:rPr lang="it-IT" sz="1200" dirty="0" err="1">
+                        <a:rPr lang="it-IT" sz="1200" dirty="0">
                           <a:solidFill>
                             <a:schemeClr val="tx1"/>
                           </a:solidFill>
@@ -3689,13 +7199,7 @@
           <p:cNvGraphicFramePr>
             <a:graphicFrameLocks noGrp="1"/>
           </p:cNvGraphicFramePr>
-          <p:nvPr>
-            <p:extLst>
-              <p:ext uri="{D42A27DB-BD31-4B8C-83A1-F6EECF244321}">
-                <p14:modId xmlns:p14="http://schemas.microsoft.com/office/powerpoint/2010/main" val="2470949907"/>
-              </p:ext>
-            </p:extLst>
-          </p:nvPr>
+          <p:nvPr/>
         </p:nvGraphicFramePr>
         <p:xfrm>
           <a:off x="4326216" y="866734"/>
@@ -3724,7 +7228,7 @@
                     <a:p>
                       <a:pPr algn="ctr"/>
                       <a:r>
-                        <a:rPr lang="it-IT" sz="1200" dirty="0" err="1">
+                        <a:rPr lang="it-IT" sz="1200" dirty="0">
                           <a:solidFill>
                             <a:schemeClr val="tx1"/>
                           </a:solidFill>
@@ -3950,13 +7454,7 @@
           <p:cNvGraphicFramePr>
             <a:graphicFrameLocks noGrp="1"/>
           </p:cNvGraphicFramePr>
-          <p:nvPr>
-            <p:extLst>
-              <p:ext uri="{D42A27DB-BD31-4B8C-83A1-F6EECF244321}">
-                <p14:modId xmlns:p14="http://schemas.microsoft.com/office/powerpoint/2010/main" val="707865411"/>
-              </p:ext>
-            </p:extLst>
-          </p:nvPr>
+          <p:nvPr/>
         </p:nvGraphicFramePr>
         <p:xfrm>
           <a:off x="6526575" y="866729"/>
@@ -3985,7 +7483,7 @@
                     <a:p>
                       <a:pPr algn="ctr"/>
                       <a:r>
-                        <a:rPr lang="it-IT" sz="1200" dirty="0" err="1">
+                        <a:rPr lang="it-IT" sz="1200" dirty="0">
                           <a:solidFill>
                             <a:schemeClr val="tx1"/>
                           </a:solidFill>
@@ -4154,13 +7652,7 @@
           <p:cNvGraphicFramePr>
             <a:graphicFrameLocks noGrp="1"/>
           </p:cNvGraphicFramePr>
-          <p:nvPr>
-            <p:extLst>
-              <p:ext uri="{D42A27DB-BD31-4B8C-83A1-F6EECF244321}">
-                <p14:modId xmlns:p14="http://schemas.microsoft.com/office/powerpoint/2010/main" val="846206889"/>
-              </p:ext>
-            </p:extLst>
-          </p:nvPr>
+          <p:nvPr/>
         </p:nvGraphicFramePr>
         <p:xfrm>
           <a:off x="5235877" y="2424148"/>
@@ -4620,13 +8112,7 @@
           <p:cNvGraphicFramePr>
             <a:graphicFrameLocks noGrp="1"/>
           </p:cNvGraphicFramePr>
-          <p:nvPr>
-            <p:extLst>
-              <p:ext uri="{D42A27DB-BD31-4B8C-83A1-F6EECF244321}">
-                <p14:modId xmlns:p14="http://schemas.microsoft.com/office/powerpoint/2010/main" val="3164777079"/>
-              </p:ext>
-            </p:extLst>
-          </p:nvPr>
+          <p:nvPr/>
         </p:nvGraphicFramePr>
         <p:xfrm>
           <a:off x="4922995" y="3680116"/>
@@ -5002,13 +8488,7 @@
           <p:cNvGraphicFramePr>
             <a:graphicFrameLocks noGrp="1"/>
           </p:cNvGraphicFramePr>
-          <p:nvPr>
-            <p:extLst>
-              <p:ext uri="{D42A27DB-BD31-4B8C-83A1-F6EECF244321}">
-                <p14:modId xmlns:p14="http://schemas.microsoft.com/office/powerpoint/2010/main" val="2846287961"/>
-              </p:ext>
-            </p:extLst>
-          </p:nvPr>
+          <p:nvPr/>
         </p:nvGraphicFramePr>
         <p:xfrm>
           <a:off x="7462546" y="3680113"/>
@@ -5037,7 +8517,7 @@
                     <a:p>
                       <a:pPr algn="ctr"/>
                       <a:r>
-                        <a:rPr lang="it-IT" sz="1200" dirty="0" err="1">
+                        <a:rPr lang="it-IT" sz="1200" dirty="0">
                           <a:solidFill>
                             <a:schemeClr val="tx1"/>
                           </a:solidFill>
@@ -5336,13 +8816,7 @@
           <p:cNvGraphicFramePr>
             <a:graphicFrameLocks noGrp="1"/>
           </p:cNvGraphicFramePr>
-          <p:nvPr>
-            <p:extLst>
-              <p:ext uri="{D42A27DB-BD31-4B8C-83A1-F6EECF244321}">
-                <p14:modId xmlns:p14="http://schemas.microsoft.com/office/powerpoint/2010/main" val="998772325"/>
-              </p:ext>
-            </p:extLst>
-          </p:nvPr>
+          <p:nvPr/>
         </p:nvGraphicFramePr>
         <p:xfrm>
           <a:off x="5481346" y="10079416"/>
@@ -5371,7 +8845,7 @@
                     <a:p>
                       <a:pPr algn="ctr"/>
                       <a:r>
-                        <a:rPr lang="it-IT" sz="1200" dirty="0" err="1"/>
+                        <a:rPr lang="it-IT" sz="1200" dirty="0"/>
                         <a:t>ThermalZone</a:t>
                       </a:r>
                       <a:endParaRPr lang="it-IT" sz="900" dirty="0">
@@ -5662,13 +9136,7 @@
           <p:cNvGraphicFramePr>
             <a:graphicFrameLocks noGrp="1"/>
           </p:cNvGraphicFramePr>
-          <p:nvPr>
-            <p:extLst>
-              <p:ext uri="{D42A27DB-BD31-4B8C-83A1-F6EECF244321}">
-                <p14:modId xmlns:p14="http://schemas.microsoft.com/office/powerpoint/2010/main" val="1175287912"/>
-              </p:ext>
-            </p:extLst>
-          </p:nvPr>
+          <p:nvPr/>
         </p:nvGraphicFramePr>
         <p:xfrm>
           <a:off x="14449916" y="1297037"/>
@@ -5880,13 +9348,7 @@
           <p:cNvGraphicFramePr>
             <a:graphicFrameLocks noGrp="1"/>
           </p:cNvGraphicFramePr>
-          <p:nvPr>
-            <p:extLst>
-              <p:ext uri="{D42A27DB-BD31-4B8C-83A1-F6EECF244321}">
-                <p14:modId xmlns:p14="http://schemas.microsoft.com/office/powerpoint/2010/main" val="4287332446"/>
-              </p:ext>
-            </p:extLst>
-          </p:nvPr>
+          <p:nvPr/>
         </p:nvGraphicFramePr>
         <p:xfrm>
           <a:off x="10639919" y="792003"/>
@@ -5915,7 +9377,7 @@
                     <a:p>
                       <a:pPr algn="ctr"/>
                       <a:r>
-                        <a:rPr lang="it-IT" sz="1200" dirty="0" err="1"/>
+                        <a:rPr lang="it-IT" sz="1200" dirty="0"/>
                         <a:t>InternalLoad</a:t>
                       </a:r>
                       <a:endParaRPr lang="it-IT" sz="900" dirty="0">
@@ -6071,13 +9533,7 @@
           <p:cNvGraphicFramePr>
             <a:graphicFrameLocks noGrp="1"/>
           </p:cNvGraphicFramePr>
-          <p:nvPr>
-            <p:extLst>
-              <p:ext uri="{D42A27DB-BD31-4B8C-83A1-F6EECF244321}">
-                <p14:modId xmlns:p14="http://schemas.microsoft.com/office/powerpoint/2010/main" val="3956440294"/>
-              </p:ext>
-            </p:extLst>
-          </p:nvPr>
+          <p:nvPr/>
         </p:nvGraphicFramePr>
         <p:xfrm>
           <a:off x="12342349" y="3681975"/>
@@ -6267,13 +9723,7 @@
           <p:cNvGraphicFramePr>
             <a:graphicFrameLocks noGrp="1"/>
           </p:cNvGraphicFramePr>
-          <p:nvPr>
-            <p:extLst>
-              <p:ext uri="{D42A27DB-BD31-4B8C-83A1-F6EECF244321}">
-                <p14:modId xmlns:p14="http://schemas.microsoft.com/office/powerpoint/2010/main" val="3877384733"/>
-              </p:ext>
-            </p:extLst>
-          </p:nvPr>
+          <p:nvPr/>
         </p:nvGraphicFramePr>
         <p:xfrm>
           <a:off x="14309261" y="3681975"/>
@@ -6302,7 +9752,7 @@
                     <a:p>
                       <a:pPr algn="ctr"/>
                       <a:r>
-                        <a:rPr lang="it-IT" sz="1200" dirty="0" err="1"/>
+                        <a:rPr lang="it-IT" sz="1200" dirty="0"/>
                         <a:t>ElectricLoad</a:t>
                       </a:r>
                       <a:endParaRPr lang="it-IT" sz="900" dirty="0">
@@ -6463,13 +9913,7 @@
           <p:cNvGraphicFramePr>
             <a:graphicFrameLocks noGrp="1"/>
           </p:cNvGraphicFramePr>
-          <p:nvPr>
-            <p:extLst>
-              <p:ext uri="{D42A27DB-BD31-4B8C-83A1-F6EECF244321}">
-                <p14:modId xmlns:p14="http://schemas.microsoft.com/office/powerpoint/2010/main" val="1370805066"/>
-              </p:ext>
-            </p:extLst>
-          </p:nvPr>
+          <p:nvPr/>
         </p:nvGraphicFramePr>
         <p:xfrm>
           <a:off x="10429004" y="3681975"/>
@@ -6498,7 +9942,7 @@
                     <a:p>
                       <a:pPr algn="ctr"/>
                       <a:r>
-                        <a:rPr lang="it-IT" sz="1200" dirty="0" err="1"/>
+                        <a:rPr lang="it-IT" sz="1200" dirty="0"/>
                         <a:t>Lights</a:t>
                       </a:r>
                       <a:endParaRPr lang="it-IT" sz="900" dirty="0">
@@ -6659,13 +10103,7 @@
           <p:cNvGraphicFramePr>
             <a:graphicFrameLocks noGrp="1"/>
           </p:cNvGraphicFramePr>
-          <p:nvPr>
-            <p:extLst>
-              <p:ext uri="{D42A27DB-BD31-4B8C-83A1-F6EECF244321}">
-                <p14:modId xmlns:p14="http://schemas.microsoft.com/office/powerpoint/2010/main" val="719723495"/>
-              </p:ext>
-            </p:extLst>
-          </p:nvPr>
+          <p:nvPr/>
         </p:nvGraphicFramePr>
         <p:xfrm>
           <a:off x="19293489" y="3649394"/>
@@ -6694,7 +10132,7 @@
                     <a:p>
                       <a:pPr algn="ctr"/>
                       <a:r>
-                        <a:rPr lang="it-IT" sz="1200" dirty="0" err="1"/>
+                        <a:rPr lang="it-IT" sz="1200" dirty="0"/>
                         <a:t>SetpointDualBand</a:t>
                       </a:r>
                       <a:endParaRPr lang="it-IT" sz="900" dirty="0">
@@ -6871,13 +10309,7 @@
           <p:cNvGraphicFramePr>
             <a:graphicFrameLocks noGrp="1"/>
           </p:cNvGraphicFramePr>
-          <p:nvPr>
-            <p:extLst>
-              <p:ext uri="{D42A27DB-BD31-4B8C-83A1-F6EECF244321}">
-                <p14:modId xmlns:p14="http://schemas.microsoft.com/office/powerpoint/2010/main" val="3195085636"/>
-              </p:ext>
-            </p:extLst>
-          </p:nvPr>
+          <p:nvPr/>
         </p:nvGraphicFramePr>
         <p:xfrm>
           <a:off x="19160818" y="792003"/>
@@ -6906,7 +10338,7 @@
                     <a:p>
                       <a:pPr algn="ctr"/>
                       <a:r>
-                        <a:rPr lang="it-IT" sz="1200" dirty="0" err="1"/>
+                        <a:rPr lang="it-IT" sz="1200" dirty="0"/>
                         <a:t>Setpoint</a:t>
                       </a:r>
                       <a:endParaRPr lang="it-IT" sz="900" dirty="0">
@@ -7443,13 +10875,7 @@
           <p:cNvGraphicFramePr>
             <a:graphicFrameLocks noGrp="1"/>
           </p:cNvGraphicFramePr>
-          <p:nvPr>
-            <p:extLst>
-              <p:ext uri="{D42A27DB-BD31-4B8C-83A1-F6EECF244321}">
-                <p14:modId xmlns:p14="http://schemas.microsoft.com/office/powerpoint/2010/main" val="3135547604"/>
-              </p:ext>
-            </p:extLst>
-          </p:nvPr>
+          <p:nvPr/>
         </p:nvGraphicFramePr>
         <p:xfrm>
           <a:off x="16813748" y="3649394"/>
@@ -7478,7 +10904,7 @@
                     <a:p>
                       <a:pPr algn="ctr"/>
                       <a:r>
-                        <a:rPr lang="it-IT" sz="1200" dirty="0" err="1">
+                        <a:rPr lang="it-IT" sz="1200" dirty="0">
                           <a:solidFill>
                             <a:schemeClr val="bg1"/>
                           </a:solidFill>
@@ -7990,13 +11416,7 @@
           <p:cNvGraphicFramePr>
             <a:graphicFrameLocks noGrp="1"/>
           </p:cNvGraphicFramePr>
-          <p:nvPr>
-            <p:extLst>
-              <p:ext uri="{D42A27DB-BD31-4B8C-83A1-F6EECF244321}">
-                <p14:modId xmlns:p14="http://schemas.microsoft.com/office/powerpoint/2010/main" val="3110906955"/>
-              </p:ext>
-            </p:extLst>
-          </p:nvPr>
+          <p:nvPr/>
         </p:nvGraphicFramePr>
         <p:xfrm>
           <a:off x="15883859" y="4826201"/>
@@ -8025,7 +11445,7 @@
                     <a:p>
                       <a:pPr algn="ctr"/>
                       <a:r>
-                        <a:rPr lang="it-IT" sz="1200" dirty="0" err="1">
+                        <a:rPr lang="it-IT" sz="1200" dirty="0">
                           <a:solidFill>
                             <a:schemeClr val="bg1"/>
                           </a:solidFill>
@@ -8201,13 +11621,7 @@
           <p:cNvGraphicFramePr>
             <a:graphicFrameLocks noGrp="1"/>
           </p:cNvGraphicFramePr>
-          <p:nvPr>
-            <p:extLst>
-              <p:ext uri="{D42A27DB-BD31-4B8C-83A1-F6EECF244321}">
-                <p14:modId xmlns:p14="http://schemas.microsoft.com/office/powerpoint/2010/main" val="2452404024"/>
-              </p:ext>
-            </p:extLst>
-          </p:nvPr>
+          <p:nvPr/>
         </p:nvGraphicFramePr>
         <p:xfrm>
           <a:off x="17214798" y="8278046"/>
@@ -8236,7 +11650,7 @@
                     <a:p>
                       <a:pPr algn="ctr"/>
                       <a:r>
-                        <a:rPr lang="it-IT" sz="1200" dirty="0" err="1"/>
+                        <a:rPr lang="it-IT" sz="1200" dirty="0"/>
                         <a:t>MechanicalVentilation</a:t>
                       </a:r>
                       <a:endParaRPr lang="it-IT" sz="900" dirty="0">
@@ -8482,13 +11896,7 @@
           <p:cNvGraphicFramePr>
             <a:graphicFrameLocks noGrp="1"/>
           </p:cNvGraphicFramePr>
-          <p:nvPr>
-            <p:extLst>
-              <p:ext uri="{D42A27DB-BD31-4B8C-83A1-F6EECF244321}">
-                <p14:modId xmlns:p14="http://schemas.microsoft.com/office/powerpoint/2010/main" val="1204795995"/>
-              </p:ext>
-            </p:extLst>
-          </p:nvPr>
+          <p:nvPr/>
         </p:nvGraphicFramePr>
         <p:xfrm>
           <a:off x="11168475" y="8440059"/>
@@ -8517,7 +11925,7 @@
                     <a:p>
                       <a:pPr algn="ctr"/>
                       <a:r>
-                        <a:rPr lang="it-IT" sz="1200" dirty="0" err="1"/>
+                        <a:rPr lang="it-IT" sz="1200" dirty="0"/>
                         <a:t>AirHandlingUnit</a:t>
                       </a:r>
                       <a:endParaRPr lang="it-IT" sz="900" dirty="0">
@@ -8552,15 +11960,7 @@
                       </a:r>
                       <a:r>
                         <a:rPr lang="it-IT" sz="900" dirty="0"/>
-                        <a:t>__(</a:t>
-                      </a:r>
-                      <a:r>
-                        <a:rPr lang="it-IT" sz="900" dirty="0" err="1"/>
-                        <a:t>MechanicalVentilation</a:t>
-                      </a:r>
-                      <a:r>
-                        <a:rPr lang="it-IT" sz="900" dirty="0"/>
-                        <a:t>, </a:t>
+                        <a:t>__(MechanicalVentilation, </a:t>
                       </a:r>
                       <a:r>
                         <a:rPr lang="it-IT" sz="900" dirty="0" err="1"/>
@@ -8748,7 +12148,7 @@
     </p:spTree>
     <p:extLst>
       <p:ext uri="{BB962C8B-B14F-4D97-AF65-F5344CB8AC3E}">
-        <p14:creationId xmlns:p14="http://schemas.microsoft.com/office/powerpoint/2010/main" val="2294034823"/>
+        <p14:creationId xmlns:p14="http://schemas.microsoft.com/office/powerpoint/2010/main" val="1613130899"/>
       </p:ext>
     </p:extLst>
   </p:cSld>

</xml_diff>